<commit_message>
minor updates, deadlock detector example for mixing into other instances
</commit_message>
<xml_diff>
--- a/Aspect Oriented Programming.pptx
+++ b/Aspect Oriented Programming.pptx
@@ -317,11 +317,11 @@
           <c:showBubbleSize val="0"/>
         </c:dLbls>
         <c:gapWidth val="150"/>
-        <c:axId val="33452544"/>
-        <c:axId val="85190336"/>
+        <c:axId val="38897152"/>
+        <c:axId val="95519872"/>
       </c:barChart>
       <c:catAx>
-        <c:axId val="33452544"/>
+        <c:axId val="38897152"/>
         <c:scaling>
           <c:orientation val="minMax"/>
         </c:scaling>
@@ -330,7 +330,7 @@
         <c:majorTickMark val="out"/>
         <c:minorTickMark val="none"/>
         <c:tickLblPos val="nextTo"/>
-        <c:crossAx val="85190336"/>
+        <c:crossAx val="95519872"/>
         <c:crosses val="autoZero"/>
         <c:auto val="1"/>
         <c:lblAlgn val="ctr"/>
@@ -338,7 +338,7 @@
         <c:noMultiLvlLbl val="0"/>
       </c:catAx>
       <c:valAx>
-        <c:axId val="85190336"/>
+        <c:axId val="95519872"/>
         <c:scaling>
           <c:orientation val="minMax"/>
         </c:scaling>
@@ -349,7 +349,7 @@
         <c:majorTickMark val="out"/>
         <c:minorTickMark val="none"/>
         <c:tickLblPos val="nextTo"/>
-        <c:crossAx val="33452544"/>
+        <c:crossAx val="38897152"/>
         <c:crosses val="autoZero"/>
         <c:crossBetween val="between"/>
       </c:valAx>
@@ -540,11 +540,11 @@
           <c:showBubbleSize val="0"/>
         </c:dLbls>
         <c:gapWidth val="150"/>
-        <c:axId val="33453056"/>
-        <c:axId val="85189184"/>
+        <c:axId val="32799744"/>
+        <c:axId val="95522176"/>
       </c:barChart>
       <c:catAx>
-        <c:axId val="33453056"/>
+        <c:axId val="32799744"/>
         <c:scaling>
           <c:orientation val="minMax"/>
         </c:scaling>
@@ -553,7 +553,7 @@
         <c:majorTickMark val="out"/>
         <c:minorTickMark val="none"/>
         <c:tickLblPos val="nextTo"/>
-        <c:crossAx val="85189184"/>
+        <c:crossAx val="95522176"/>
         <c:crosses val="autoZero"/>
         <c:auto val="1"/>
         <c:lblAlgn val="ctr"/>
@@ -561,7 +561,7 @@
         <c:noMultiLvlLbl val="0"/>
       </c:catAx>
       <c:valAx>
-        <c:axId val="85189184"/>
+        <c:axId val="95522176"/>
         <c:scaling>
           <c:orientation val="minMax"/>
         </c:scaling>
@@ -572,7 +572,7 @@
         <c:majorTickMark val="out"/>
         <c:minorTickMark val="none"/>
         <c:tickLblPos val="nextTo"/>
-        <c:crossAx val="33453056"/>
+        <c:crossAx val="32799744"/>
         <c:crosses val="autoZero"/>
         <c:crossBetween val="between"/>
       </c:valAx>
@@ -775,11 +775,11 @@
           <c:showBubbleSize val="0"/>
         </c:dLbls>
         <c:gapWidth val="150"/>
-        <c:axId val="37291008"/>
-        <c:axId val="76062720"/>
+        <c:axId val="39412736"/>
+        <c:axId val="95525056"/>
       </c:barChart>
       <c:catAx>
-        <c:axId val="37291008"/>
+        <c:axId val="39412736"/>
         <c:scaling>
           <c:orientation val="minMax"/>
         </c:scaling>
@@ -788,7 +788,7 @@
         <c:majorTickMark val="out"/>
         <c:minorTickMark val="none"/>
         <c:tickLblPos val="nextTo"/>
-        <c:crossAx val="76062720"/>
+        <c:crossAx val="95525056"/>
         <c:crosses val="autoZero"/>
         <c:auto val="1"/>
         <c:lblAlgn val="ctr"/>
@@ -796,7 +796,7 @@
         <c:noMultiLvlLbl val="0"/>
       </c:catAx>
       <c:valAx>
-        <c:axId val="76062720"/>
+        <c:axId val="95525056"/>
         <c:scaling>
           <c:orientation val="minMax"/>
         </c:scaling>
@@ -807,7 +807,7 @@
         <c:majorTickMark val="out"/>
         <c:minorTickMark val="none"/>
         <c:tickLblPos val="nextTo"/>
-        <c:crossAx val="37291008"/>
+        <c:crossAx val="39412736"/>
         <c:crosses val="autoZero"/>
         <c:crossBetween val="between"/>
       </c:valAx>
@@ -998,11 +998,11 @@
           <c:showBubbleSize val="0"/>
         </c:dLbls>
         <c:gapWidth val="150"/>
-        <c:axId val="35122688"/>
-        <c:axId val="85167488"/>
+        <c:axId val="39414272"/>
+        <c:axId val="39364864"/>
       </c:barChart>
       <c:catAx>
-        <c:axId val="35122688"/>
+        <c:axId val="39414272"/>
         <c:scaling>
           <c:orientation val="minMax"/>
         </c:scaling>
@@ -1011,7 +1011,7 @@
         <c:majorTickMark val="out"/>
         <c:minorTickMark val="none"/>
         <c:tickLblPos val="nextTo"/>
-        <c:crossAx val="85167488"/>
+        <c:crossAx val="39364864"/>
         <c:crosses val="autoZero"/>
         <c:auto val="1"/>
         <c:lblAlgn val="ctr"/>
@@ -1019,7 +1019,7 @@
         <c:noMultiLvlLbl val="0"/>
       </c:catAx>
       <c:valAx>
-        <c:axId val="85167488"/>
+        <c:axId val="39364864"/>
         <c:scaling>
           <c:orientation val="minMax"/>
         </c:scaling>
@@ -1030,7 +1030,7 @@
         <c:majorTickMark val="out"/>
         <c:minorTickMark val="none"/>
         <c:tickLblPos val="nextTo"/>
-        <c:crossAx val="35122688"/>
+        <c:crossAx val="39414272"/>
         <c:crosses val="autoZero"/>
         <c:crossBetween val="between"/>
       </c:valAx>
@@ -1260,12 +1260,12 @@
         </c:dLbls>
         <c:gapWidth val="150"/>
         <c:shape val="box"/>
-        <c:axId val="37290496"/>
-        <c:axId val="85193792"/>
+        <c:axId val="94285312"/>
+        <c:axId val="95526208"/>
         <c:axId val="0"/>
       </c:bar3DChart>
       <c:catAx>
-        <c:axId val="37290496"/>
+        <c:axId val="94285312"/>
         <c:scaling>
           <c:orientation val="minMax"/>
         </c:scaling>
@@ -1274,7 +1274,7 @@
         <c:majorTickMark val="out"/>
         <c:minorTickMark val="none"/>
         <c:tickLblPos val="nextTo"/>
-        <c:crossAx val="85193792"/>
+        <c:crossAx val="95526208"/>
         <c:crosses val="autoZero"/>
         <c:auto val="1"/>
         <c:lblAlgn val="ctr"/>
@@ -1282,7 +1282,7 @@
         <c:noMultiLvlLbl val="0"/>
       </c:catAx>
       <c:valAx>
-        <c:axId val="85193792"/>
+        <c:axId val="95526208"/>
         <c:scaling>
           <c:orientation val="minMax"/>
         </c:scaling>
@@ -1293,7 +1293,7 @@
         <c:majorTickMark val="out"/>
         <c:minorTickMark val="none"/>
         <c:tickLblPos val="nextTo"/>
-        <c:crossAx val="37290496"/>
+        <c:crossAx val="94285312"/>
         <c:crosses val="autoZero"/>
         <c:crossBetween val="between"/>
       </c:valAx>
@@ -1508,12 +1508,12 @@
         </c:dLbls>
         <c:gapWidth val="150"/>
         <c:shape val="cylinder"/>
-        <c:axId val="37343232"/>
-        <c:axId val="85196096"/>
+        <c:axId val="96104448"/>
+        <c:axId val="110126784"/>
         <c:axId val="0"/>
       </c:bar3DChart>
       <c:catAx>
-        <c:axId val="37343232"/>
+        <c:axId val="96104448"/>
         <c:scaling>
           <c:orientation val="minMax"/>
         </c:scaling>
@@ -1522,7 +1522,7 @@
         <c:majorTickMark val="out"/>
         <c:minorTickMark val="none"/>
         <c:tickLblPos val="nextTo"/>
-        <c:crossAx val="85196096"/>
+        <c:crossAx val="110126784"/>
         <c:crosses val="autoZero"/>
         <c:auto val="1"/>
         <c:lblAlgn val="ctr"/>
@@ -1530,7 +1530,7 @@
         <c:noMultiLvlLbl val="0"/>
       </c:catAx>
       <c:valAx>
-        <c:axId val="85196096"/>
+        <c:axId val="110126784"/>
         <c:scaling>
           <c:orientation val="minMax"/>
         </c:scaling>
@@ -1541,7 +1541,7 @@
         <c:majorTickMark val="out"/>
         <c:minorTickMark val="none"/>
         <c:tickLblPos val="nextTo"/>
-        <c:crossAx val="37343232"/>
+        <c:crossAx val="96104448"/>
         <c:crosses val="autoZero"/>
         <c:crossBetween val="between"/>
       </c:valAx>
@@ -1648,7 +1648,7 @@
           <a:p>
             <a:fld id="{CB0D08CA-444A-433D-9C5A-2E06160C9E94}" type="datetimeFigureOut">
               <a:rPr lang="en-US" smtClean="0"/>
-              <a:t>4/16/2011</a:t>
+              <a:t>11/2/2011</a:t>
             </a:fld>
             <a:endParaRPr lang="en-US"/>
           </a:p>
@@ -4006,7 +4006,7 @@
           <a:p>
             <a:fld id="{6D4D0624-7EDB-4A20-80F1-C7B3952B8641}" type="datetimeFigureOut">
               <a:rPr lang="en-US" smtClean="0"/>
-              <a:t>4/16/2011</a:t>
+              <a:t>11/2/2011</a:t>
             </a:fld>
             <a:endParaRPr lang="en-US"/>
           </a:p>
@@ -5111,7 +5111,7 @@
           <a:p>
             <a:fld id="{6D4D0624-7EDB-4A20-80F1-C7B3952B8641}" type="datetimeFigureOut">
               <a:rPr lang="en-US" smtClean="0"/>
-              <a:t>4/16/2011</a:t>
+              <a:t>11/2/2011</a:t>
             </a:fld>
             <a:endParaRPr lang="en-US"/>
           </a:p>
@@ -6224,7 +6224,7 @@
           <a:p>
             <a:fld id="{6D4D0624-7EDB-4A20-80F1-C7B3952B8641}" type="datetimeFigureOut">
               <a:rPr lang="en-US" smtClean="0"/>
-              <a:t>4/16/2011</a:t>
+              <a:t>11/2/2011</a:t>
             </a:fld>
             <a:endParaRPr lang="en-US"/>
           </a:p>
@@ -7332,7 +7332,7 @@
           <a:p>
             <a:fld id="{6D4D0624-7EDB-4A20-80F1-C7B3952B8641}" type="datetimeFigureOut">
               <a:rPr lang="en-US" smtClean="0"/>
-              <a:t>4/16/2011</a:t>
+              <a:t>11/2/2011</a:t>
             </a:fld>
             <a:endParaRPr lang="en-US"/>
           </a:p>
@@ -8925,7 +8925,7 @@
           <a:p>
             <a:fld id="{6D4D0624-7EDB-4A20-80F1-C7B3952B8641}" type="datetimeFigureOut">
               <a:rPr lang="en-US" smtClean="0"/>
-              <a:t>4/16/2011</a:t>
+              <a:t>11/2/2011</a:t>
             </a:fld>
             <a:endParaRPr lang="en-US"/>
           </a:p>
@@ -9983,7 +9983,7 @@
           <a:p>
             <a:fld id="{6D4D0624-7EDB-4A20-80F1-C7B3952B8641}" type="datetimeFigureOut">
               <a:rPr lang="en-US" smtClean="0"/>
-              <a:t>4/16/2011</a:t>
+              <a:t>11/2/2011</a:t>
             </a:fld>
             <a:endParaRPr lang="en-US"/>
           </a:p>
@@ -11310,7 +11310,7 @@
           <a:p>
             <a:fld id="{6D4D0624-7EDB-4A20-80F1-C7B3952B8641}" type="datetimeFigureOut">
               <a:rPr lang="en-US" smtClean="0"/>
-              <a:t>4/16/2011</a:t>
+              <a:t>11/2/2011</a:t>
             </a:fld>
             <a:endParaRPr lang="en-US"/>
           </a:p>
@@ -12447,7 +12447,7 @@
           <a:p>
             <a:fld id="{6D4D0624-7EDB-4A20-80F1-C7B3952B8641}" type="datetimeFigureOut">
               <a:rPr lang="en-US" smtClean="0"/>
-              <a:t>4/16/2011</a:t>
+              <a:t>11/2/2011</a:t>
             </a:fld>
             <a:endParaRPr lang="en-US"/>
           </a:p>
@@ -13503,7 +13503,7 @@
           <a:p>
             <a:fld id="{6D4D0624-7EDB-4A20-80F1-C7B3952B8641}" type="datetimeFigureOut">
               <a:rPr lang="en-US" smtClean="0"/>
-              <a:t>4/16/2011</a:t>
+              <a:t>11/2/2011</a:t>
             </a:fld>
             <a:endParaRPr lang="en-US"/>
           </a:p>
@@ -14541,7 +14541,7 @@
           <a:p>
             <a:fld id="{6D4D0624-7EDB-4A20-80F1-C7B3952B8641}" type="datetimeFigureOut">
               <a:rPr lang="en-US" smtClean="0"/>
-              <a:t>4/16/2011</a:t>
+              <a:t>11/2/2011</a:t>
             </a:fld>
             <a:endParaRPr lang="en-US"/>
           </a:p>
@@ -15776,7 +15776,7 @@
           <a:p>
             <a:fld id="{6D4D0624-7EDB-4A20-80F1-C7B3952B8641}" type="datetimeFigureOut">
               <a:rPr lang="en-US" smtClean="0"/>
-              <a:t>4/16/2011</a:t>
+              <a:t>11/2/2011</a:t>
             </a:fld>
             <a:endParaRPr lang="en-US"/>
           </a:p>
@@ -16129,7 +16129,7 @@
           <a:p>
             <a:fld id="{6D4D0624-7EDB-4A20-80F1-C7B3952B8641}" type="datetimeFigureOut">
               <a:rPr lang="en-US" smtClean="0"/>
-              <a:t>4/16/2011</a:t>
+              <a:t>11/2/2011</a:t>
             </a:fld>
             <a:endParaRPr lang="en-US"/>
           </a:p>
@@ -16686,13 +16686,13 @@
   <p:clrMapOvr>
     <a:masterClrMapping/>
   </p:clrMapOvr>
-  <mc:AlternateContent xmlns:mc="http://schemas.openxmlformats.org/markup-compatibility/2006" xmlns:p14="http://schemas.microsoft.com/office/powerpoint/2010/main">
-    <mc:Choice Requires="p14">
-      <p:transition>
+  <mc:AlternateContent xmlns:mc="http://schemas.openxmlformats.org/markup-compatibility/2006">
+    <mc:Choice xmlns:p14="http://schemas.microsoft.com/office/powerpoint/2010/main" Requires="p14">
+      <p:transition p14:dur="200">
         <p14:flythrough/>
       </p:transition>
     </mc:Choice>
-    <mc:Fallback xmlns="">
+    <mc:Fallback>
       <p:transition>
         <p:fade/>
       </p:transition>
@@ -16837,13 +16837,13 @@
   <p:clrMapOvr>
     <a:masterClrMapping/>
   </p:clrMapOvr>
-  <mc:AlternateContent xmlns:mc="http://schemas.openxmlformats.org/markup-compatibility/2006" xmlns:p14="http://schemas.microsoft.com/office/powerpoint/2010/main">
-    <mc:Choice Requires="p14">
-      <p:transition>
+  <mc:AlternateContent xmlns:mc="http://schemas.openxmlformats.org/markup-compatibility/2006">
+    <mc:Choice xmlns:p14="http://schemas.microsoft.com/office/powerpoint/2010/main" Requires="p14">
+      <p:transition p14:dur="200">
         <p14:flythrough/>
       </p:transition>
     </mc:Choice>
-    <mc:Fallback xmlns="">
+    <mc:Fallback>
       <p:transition>
         <p:fade/>
       </p:transition>
@@ -16992,13 +16992,13 @@
   <p:clrMapOvr>
     <a:masterClrMapping/>
   </p:clrMapOvr>
-  <mc:AlternateContent xmlns:mc="http://schemas.openxmlformats.org/markup-compatibility/2006" xmlns:p14="http://schemas.microsoft.com/office/powerpoint/2010/main">
-    <mc:Choice Requires="p14">
-      <p:transition>
+  <mc:AlternateContent xmlns:mc="http://schemas.openxmlformats.org/markup-compatibility/2006">
+    <mc:Choice xmlns:p14="http://schemas.microsoft.com/office/powerpoint/2010/main" Requires="p14">
+      <p:transition p14:dur="200">
         <p14:flythrough/>
       </p:transition>
     </mc:Choice>
-    <mc:Fallback xmlns="">
+    <mc:Fallback>
       <p:transition>
         <p:fade/>
       </p:transition>
@@ -17007,9 +17007,451 @@
   <p:timing>
     <p:tnLst>
       <p:par>
-        <p:cTn id="1" dur="indefinite" restart="never" nodeType="tmRoot"/>
+        <p:cTn id="1" dur="indefinite" restart="never" nodeType="tmRoot">
+          <p:childTnLst>
+            <p:seq concurrent="1" nextAc="seek">
+              <p:cTn id="2" dur="indefinite" nodeType="mainSeq">
+                <p:childTnLst>
+                  <p:par>
+                    <p:cTn id="3" fill="hold">
+                      <p:stCondLst>
+                        <p:cond delay="indefinite"/>
+                      </p:stCondLst>
+                      <p:childTnLst>
+                        <p:par>
+                          <p:cTn id="4" fill="hold">
+                            <p:stCondLst>
+                              <p:cond delay="0"/>
+                            </p:stCondLst>
+                            <p:childTnLst>
+                              <p:par>
+                                <p:cTn id="5" presetID="10" presetClass="entr" presetSubtype="0" fill="hold" grpId="0" nodeType="clickEffect">
+                                  <p:stCondLst>
+                                    <p:cond delay="0"/>
+                                  </p:stCondLst>
+                                  <p:childTnLst>
+                                    <p:set>
+                                      <p:cBhvr>
+                                        <p:cTn id="6" dur="1" fill="hold">
+                                          <p:stCondLst>
+                                            <p:cond delay="0"/>
+                                          </p:stCondLst>
+                                        </p:cTn>
+                                        <p:tgtEl>
+                                          <p:spTgt spid="3">
+                                            <p:txEl>
+                                              <p:pRg st="0" end="0"/>
+                                            </p:txEl>
+                                          </p:spTgt>
+                                        </p:tgtEl>
+                                        <p:attrNameLst>
+                                          <p:attrName>style.visibility</p:attrName>
+                                        </p:attrNameLst>
+                                      </p:cBhvr>
+                                      <p:to>
+                                        <p:strVal val="visible"/>
+                                      </p:to>
+                                    </p:set>
+                                    <p:animEffect transition="in" filter="fade">
+                                      <p:cBhvr>
+                                        <p:cTn id="7" dur="500"/>
+                                        <p:tgtEl>
+                                          <p:spTgt spid="3">
+                                            <p:txEl>
+                                              <p:pRg st="0" end="0"/>
+                                            </p:txEl>
+                                          </p:spTgt>
+                                        </p:tgtEl>
+                                      </p:cBhvr>
+                                    </p:animEffect>
+                                  </p:childTnLst>
+                                </p:cTn>
+                              </p:par>
+                              <p:par>
+                                <p:cTn id="8" presetID="10" presetClass="entr" presetSubtype="0" fill="hold" grpId="0" nodeType="withEffect">
+                                  <p:stCondLst>
+                                    <p:cond delay="0"/>
+                                  </p:stCondLst>
+                                  <p:childTnLst>
+                                    <p:set>
+                                      <p:cBhvr>
+                                        <p:cTn id="9" dur="1" fill="hold">
+                                          <p:stCondLst>
+                                            <p:cond delay="0"/>
+                                          </p:stCondLst>
+                                        </p:cTn>
+                                        <p:tgtEl>
+                                          <p:spTgt spid="3">
+                                            <p:txEl>
+                                              <p:pRg st="1" end="1"/>
+                                            </p:txEl>
+                                          </p:spTgt>
+                                        </p:tgtEl>
+                                        <p:attrNameLst>
+                                          <p:attrName>style.visibility</p:attrName>
+                                        </p:attrNameLst>
+                                      </p:cBhvr>
+                                      <p:to>
+                                        <p:strVal val="visible"/>
+                                      </p:to>
+                                    </p:set>
+                                    <p:animEffect transition="in" filter="fade">
+                                      <p:cBhvr>
+                                        <p:cTn id="10" dur="500"/>
+                                        <p:tgtEl>
+                                          <p:spTgt spid="3">
+                                            <p:txEl>
+                                              <p:pRg st="1" end="1"/>
+                                            </p:txEl>
+                                          </p:spTgt>
+                                        </p:tgtEl>
+                                      </p:cBhvr>
+                                    </p:animEffect>
+                                  </p:childTnLst>
+                                </p:cTn>
+                              </p:par>
+                            </p:childTnLst>
+                          </p:cTn>
+                        </p:par>
+                      </p:childTnLst>
+                    </p:cTn>
+                  </p:par>
+                  <p:par>
+                    <p:cTn id="11" fill="hold">
+                      <p:stCondLst>
+                        <p:cond delay="indefinite"/>
+                      </p:stCondLst>
+                      <p:childTnLst>
+                        <p:par>
+                          <p:cTn id="12" fill="hold">
+                            <p:stCondLst>
+                              <p:cond delay="0"/>
+                            </p:stCondLst>
+                            <p:childTnLst>
+                              <p:par>
+                                <p:cTn id="13" presetID="10" presetClass="entr" presetSubtype="0" fill="hold" grpId="0" nodeType="clickEffect">
+                                  <p:stCondLst>
+                                    <p:cond delay="0"/>
+                                  </p:stCondLst>
+                                  <p:childTnLst>
+                                    <p:set>
+                                      <p:cBhvr>
+                                        <p:cTn id="14" dur="1" fill="hold">
+                                          <p:stCondLst>
+                                            <p:cond delay="0"/>
+                                          </p:stCondLst>
+                                        </p:cTn>
+                                        <p:tgtEl>
+                                          <p:spTgt spid="3">
+                                            <p:txEl>
+                                              <p:pRg st="2" end="2"/>
+                                            </p:txEl>
+                                          </p:spTgt>
+                                        </p:tgtEl>
+                                        <p:attrNameLst>
+                                          <p:attrName>style.visibility</p:attrName>
+                                        </p:attrNameLst>
+                                      </p:cBhvr>
+                                      <p:to>
+                                        <p:strVal val="visible"/>
+                                      </p:to>
+                                    </p:set>
+                                    <p:animEffect transition="in" filter="fade">
+                                      <p:cBhvr>
+                                        <p:cTn id="15" dur="500"/>
+                                        <p:tgtEl>
+                                          <p:spTgt spid="3">
+                                            <p:txEl>
+                                              <p:pRg st="2" end="2"/>
+                                            </p:txEl>
+                                          </p:spTgt>
+                                        </p:tgtEl>
+                                      </p:cBhvr>
+                                    </p:animEffect>
+                                  </p:childTnLst>
+                                </p:cTn>
+                              </p:par>
+                              <p:par>
+                                <p:cTn id="16" presetID="10" presetClass="entr" presetSubtype="0" fill="hold" grpId="0" nodeType="withEffect">
+                                  <p:stCondLst>
+                                    <p:cond delay="0"/>
+                                  </p:stCondLst>
+                                  <p:childTnLst>
+                                    <p:set>
+                                      <p:cBhvr>
+                                        <p:cTn id="17" dur="1" fill="hold">
+                                          <p:stCondLst>
+                                            <p:cond delay="0"/>
+                                          </p:stCondLst>
+                                        </p:cTn>
+                                        <p:tgtEl>
+                                          <p:spTgt spid="3">
+                                            <p:txEl>
+                                              <p:pRg st="3" end="3"/>
+                                            </p:txEl>
+                                          </p:spTgt>
+                                        </p:tgtEl>
+                                        <p:attrNameLst>
+                                          <p:attrName>style.visibility</p:attrName>
+                                        </p:attrNameLst>
+                                      </p:cBhvr>
+                                      <p:to>
+                                        <p:strVal val="visible"/>
+                                      </p:to>
+                                    </p:set>
+                                    <p:animEffect transition="in" filter="fade">
+                                      <p:cBhvr>
+                                        <p:cTn id="18" dur="500"/>
+                                        <p:tgtEl>
+                                          <p:spTgt spid="3">
+                                            <p:txEl>
+                                              <p:pRg st="3" end="3"/>
+                                            </p:txEl>
+                                          </p:spTgt>
+                                        </p:tgtEl>
+                                      </p:cBhvr>
+                                    </p:animEffect>
+                                  </p:childTnLst>
+                                </p:cTn>
+                              </p:par>
+                              <p:par>
+                                <p:cTn id="19" presetID="10" presetClass="entr" presetSubtype="0" fill="hold" grpId="0" nodeType="withEffect">
+                                  <p:stCondLst>
+                                    <p:cond delay="0"/>
+                                  </p:stCondLst>
+                                  <p:childTnLst>
+                                    <p:set>
+                                      <p:cBhvr>
+                                        <p:cTn id="20" dur="1" fill="hold">
+                                          <p:stCondLst>
+                                            <p:cond delay="0"/>
+                                          </p:stCondLst>
+                                        </p:cTn>
+                                        <p:tgtEl>
+                                          <p:spTgt spid="3">
+                                            <p:txEl>
+                                              <p:pRg st="4" end="4"/>
+                                            </p:txEl>
+                                          </p:spTgt>
+                                        </p:tgtEl>
+                                        <p:attrNameLst>
+                                          <p:attrName>style.visibility</p:attrName>
+                                        </p:attrNameLst>
+                                      </p:cBhvr>
+                                      <p:to>
+                                        <p:strVal val="visible"/>
+                                      </p:to>
+                                    </p:set>
+                                    <p:animEffect transition="in" filter="fade">
+                                      <p:cBhvr>
+                                        <p:cTn id="21" dur="500"/>
+                                        <p:tgtEl>
+                                          <p:spTgt spid="3">
+                                            <p:txEl>
+                                              <p:pRg st="4" end="4"/>
+                                            </p:txEl>
+                                          </p:spTgt>
+                                        </p:tgtEl>
+                                      </p:cBhvr>
+                                    </p:animEffect>
+                                  </p:childTnLst>
+                                </p:cTn>
+                              </p:par>
+                              <p:par>
+                                <p:cTn id="22" presetID="10" presetClass="entr" presetSubtype="0" fill="hold" grpId="0" nodeType="withEffect">
+                                  <p:stCondLst>
+                                    <p:cond delay="0"/>
+                                  </p:stCondLst>
+                                  <p:childTnLst>
+                                    <p:set>
+                                      <p:cBhvr>
+                                        <p:cTn id="23" dur="1" fill="hold">
+                                          <p:stCondLst>
+                                            <p:cond delay="0"/>
+                                          </p:stCondLst>
+                                        </p:cTn>
+                                        <p:tgtEl>
+                                          <p:spTgt spid="3">
+                                            <p:txEl>
+                                              <p:pRg st="5" end="5"/>
+                                            </p:txEl>
+                                          </p:spTgt>
+                                        </p:tgtEl>
+                                        <p:attrNameLst>
+                                          <p:attrName>style.visibility</p:attrName>
+                                        </p:attrNameLst>
+                                      </p:cBhvr>
+                                      <p:to>
+                                        <p:strVal val="visible"/>
+                                      </p:to>
+                                    </p:set>
+                                    <p:animEffect transition="in" filter="fade">
+                                      <p:cBhvr>
+                                        <p:cTn id="24" dur="500"/>
+                                        <p:tgtEl>
+                                          <p:spTgt spid="3">
+                                            <p:txEl>
+                                              <p:pRg st="5" end="5"/>
+                                            </p:txEl>
+                                          </p:spTgt>
+                                        </p:tgtEl>
+                                      </p:cBhvr>
+                                    </p:animEffect>
+                                  </p:childTnLst>
+                                </p:cTn>
+                              </p:par>
+                            </p:childTnLst>
+                          </p:cTn>
+                        </p:par>
+                      </p:childTnLst>
+                    </p:cTn>
+                  </p:par>
+                  <p:par>
+                    <p:cTn id="25" fill="hold">
+                      <p:stCondLst>
+                        <p:cond delay="indefinite"/>
+                      </p:stCondLst>
+                      <p:childTnLst>
+                        <p:par>
+                          <p:cTn id="26" fill="hold">
+                            <p:stCondLst>
+                              <p:cond delay="0"/>
+                            </p:stCondLst>
+                            <p:childTnLst>
+                              <p:par>
+                                <p:cTn id="27" presetID="10" presetClass="entr" presetSubtype="0" fill="hold" grpId="0" nodeType="clickEffect">
+                                  <p:stCondLst>
+                                    <p:cond delay="0"/>
+                                  </p:stCondLst>
+                                  <p:childTnLst>
+                                    <p:set>
+                                      <p:cBhvr>
+                                        <p:cTn id="28" dur="1" fill="hold">
+                                          <p:stCondLst>
+                                            <p:cond delay="0"/>
+                                          </p:stCondLst>
+                                        </p:cTn>
+                                        <p:tgtEl>
+                                          <p:spTgt spid="3">
+                                            <p:txEl>
+                                              <p:pRg st="6" end="6"/>
+                                            </p:txEl>
+                                          </p:spTgt>
+                                        </p:tgtEl>
+                                        <p:attrNameLst>
+                                          <p:attrName>style.visibility</p:attrName>
+                                        </p:attrNameLst>
+                                      </p:cBhvr>
+                                      <p:to>
+                                        <p:strVal val="visible"/>
+                                      </p:to>
+                                    </p:set>
+                                    <p:animEffect transition="in" filter="fade">
+                                      <p:cBhvr>
+                                        <p:cTn id="29" dur="500"/>
+                                        <p:tgtEl>
+                                          <p:spTgt spid="3">
+                                            <p:txEl>
+                                              <p:pRg st="6" end="6"/>
+                                            </p:txEl>
+                                          </p:spTgt>
+                                        </p:tgtEl>
+                                      </p:cBhvr>
+                                    </p:animEffect>
+                                  </p:childTnLst>
+                                </p:cTn>
+                              </p:par>
+                            </p:childTnLst>
+                          </p:cTn>
+                        </p:par>
+                      </p:childTnLst>
+                    </p:cTn>
+                  </p:par>
+                  <p:par>
+                    <p:cTn id="30" fill="hold">
+                      <p:stCondLst>
+                        <p:cond delay="indefinite"/>
+                      </p:stCondLst>
+                      <p:childTnLst>
+                        <p:par>
+                          <p:cTn id="31" fill="hold">
+                            <p:stCondLst>
+                              <p:cond delay="0"/>
+                            </p:stCondLst>
+                            <p:childTnLst>
+                              <p:par>
+                                <p:cTn id="32" presetID="10" presetClass="entr" presetSubtype="0" fill="hold" grpId="0" nodeType="clickEffect">
+                                  <p:stCondLst>
+                                    <p:cond delay="0"/>
+                                  </p:stCondLst>
+                                  <p:childTnLst>
+                                    <p:set>
+                                      <p:cBhvr>
+                                        <p:cTn id="33" dur="1" fill="hold">
+                                          <p:stCondLst>
+                                            <p:cond delay="0"/>
+                                          </p:stCondLst>
+                                        </p:cTn>
+                                        <p:tgtEl>
+                                          <p:spTgt spid="3">
+                                            <p:txEl>
+                                              <p:pRg st="7" end="7"/>
+                                            </p:txEl>
+                                          </p:spTgt>
+                                        </p:tgtEl>
+                                        <p:attrNameLst>
+                                          <p:attrName>style.visibility</p:attrName>
+                                        </p:attrNameLst>
+                                      </p:cBhvr>
+                                      <p:to>
+                                        <p:strVal val="visible"/>
+                                      </p:to>
+                                    </p:set>
+                                    <p:animEffect transition="in" filter="fade">
+                                      <p:cBhvr>
+                                        <p:cTn id="34" dur="500"/>
+                                        <p:tgtEl>
+                                          <p:spTgt spid="3">
+                                            <p:txEl>
+                                              <p:pRg st="7" end="7"/>
+                                            </p:txEl>
+                                          </p:spTgt>
+                                        </p:tgtEl>
+                                      </p:cBhvr>
+                                    </p:animEffect>
+                                  </p:childTnLst>
+                                </p:cTn>
+                              </p:par>
+                            </p:childTnLst>
+                          </p:cTn>
+                        </p:par>
+                      </p:childTnLst>
+                    </p:cTn>
+                  </p:par>
+                </p:childTnLst>
+              </p:cTn>
+              <p:prevCondLst>
+                <p:cond evt="onPrev" delay="0">
+                  <p:tgtEl>
+                    <p:sldTgt/>
+                  </p:tgtEl>
+                </p:cond>
+              </p:prevCondLst>
+              <p:nextCondLst>
+                <p:cond evt="onNext" delay="0">
+                  <p:tgtEl>
+                    <p:sldTgt/>
+                  </p:tgtEl>
+                </p:cond>
+              </p:nextCondLst>
+            </p:seq>
+          </p:childTnLst>
+        </p:cTn>
       </p:par>
     </p:tnLst>
+    <p:bldLst>
+      <p:bldP spid="3" grpId="0" build="p"/>
+    </p:bldLst>
   </p:timing>
 </p:sld>
 </file>
@@ -17089,13 +17531,13 @@
   <p:clrMapOvr>
     <a:masterClrMapping/>
   </p:clrMapOvr>
-  <mc:AlternateContent xmlns:mc="http://schemas.openxmlformats.org/markup-compatibility/2006" xmlns:p14="http://schemas.microsoft.com/office/powerpoint/2010/main">
-    <mc:Choice Requires="p14">
-      <p:transition>
+  <mc:AlternateContent xmlns:mc="http://schemas.openxmlformats.org/markup-compatibility/2006">
+    <mc:Choice xmlns:p14="http://schemas.microsoft.com/office/powerpoint/2010/main" Requires="p14">
+      <p:transition p14:dur="200">
         <p14:flythrough/>
       </p:transition>
     </mc:Choice>
-    <mc:Fallback xmlns="">
+    <mc:Fallback>
       <p:transition>
         <p:fade/>
       </p:transition>
@@ -17186,13 +17628,13 @@
   <p:clrMapOvr>
     <a:masterClrMapping/>
   </p:clrMapOvr>
-  <mc:AlternateContent xmlns:mc="http://schemas.openxmlformats.org/markup-compatibility/2006" xmlns:p14="http://schemas.microsoft.com/office/powerpoint/2010/main">
-    <mc:Choice Requires="p14">
-      <p:transition>
+  <mc:AlternateContent xmlns:mc="http://schemas.openxmlformats.org/markup-compatibility/2006">
+    <mc:Choice xmlns:p14="http://schemas.microsoft.com/office/powerpoint/2010/main" Requires="p14">
+      <p:transition p14:dur="200">
         <p14:flythrough/>
       </p:transition>
     </mc:Choice>
-    <mc:Fallback xmlns="">
+    <mc:Fallback>
       <p:transition>
         <p:fade/>
       </p:transition>
@@ -17446,13 +17888,13 @@
   <p:clrMapOvr>
     <a:masterClrMapping/>
   </p:clrMapOvr>
-  <mc:AlternateContent xmlns:mc="http://schemas.openxmlformats.org/markup-compatibility/2006" xmlns:p14="http://schemas.microsoft.com/office/powerpoint/2010/main">
-    <mc:Choice Requires="p14">
-      <p:transition>
+  <mc:AlternateContent xmlns:mc="http://schemas.openxmlformats.org/markup-compatibility/2006">
+    <mc:Choice xmlns:p14="http://schemas.microsoft.com/office/powerpoint/2010/main" Requires="p14">
+      <p:transition p14:dur="200">
         <p14:flythrough/>
       </p:transition>
     </mc:Choice>
-    <mc:Fallback xmlns="">
+    <mc:Fallback>
       <p:transition>
         <p:fade/>
       </p:transition>
@@ -17545,13 +17987,13 @@
   <p:clrMapOvr>
     <a:masterClrMapping/>
   </p:clrMapOvr>
-  <mc:AlternateContent xmlns:mc="http://schemas.openxmlformats.org/markup-compatibility/2006" xmlns:p14="http://schemas.microsoft.com/office/powerpoint/2010/main">
-    <mc:Choice Requires="p14">
-      <p:transition>
+  <mc:AlternateContent xmlns:mc="http://schemas.openxmlformats.org/markup-compatibility/2006">
+    <mc:Choice xmlns:p14="http://schemas.microsoft.com/office/powerpoint/2010/main" Requires="p14">
+      <p:transition p14:dur="200">
         <p14:flythrough/>
       </p:transition>
     </mc:Choice>
-    <mc:Fallback xmlns="">
+    <mc:Fallback>
       <p:transition>
         <p:fade/>
       </p:transition>
@@ -17644,13 +18086,13 @@
   <p:clrMapOvr>
     <a:masterClrMapping/>
   </p:clrMapOvr>
-  <mc:AlternateContent xmlns:mc="http://schemas.openxmlformats.org/markup-compatibility/2006" xmlns:p14="http://schemas.microsoft.com/office/powerpoint/2010/main">
-    <mc:Choice Requires="p14">
-      <p:transition>
+  <mc:AlternateContent xmlns:mc="http://schemas.openxmlformats.org/markup-compatibility/2006">
+    <mc:Choice xmlns:p14="http://schemas.microsoft.com/office/powerpoint/2010/main" Requires="p14">
+      <p:transition p14:dur="200">
         <p14:flythrough/>
       </p:transition>
     </mc:Choice>
-    <mc:Fallback xmlns="">
+    <mc:Fallback>
       <p:transition>
         <p:fade/>
       </p:transition>
@@ -17743,13 +18185,13 @@
   <p:clrMapOvr>
     <a:masterClrMapping/>
   </p:clrMapOvr>
-  <mc:AlternateContent xmlns:mc="http://schemas.openxmlformats.org/markup-compatibility/2006" xmlns:p14="http://schemas.microsoft.com/office/powerpoint/2010/main">
-    <mc:Choice Requires="p14">
-      <p:transition>
+  <mc:AlternateContent xmlns:mc="http://schemas.openxmlformats.org/markup-compatibility/2006">
+    <mc:Choice xmlns:p14="http://schemas.microsoft.com/office/powerpoint/2010/main" Requires="p14">
+      <p:transition p14:dur="200">
         <p14:flythrough/>
       </p:transition>
     </mc:Choice>
-    <mc:Fallback xmlns="">
+    <mc:Fallback>
       <p:transition>
         <p:fade/>
       </p:transition>
@@ -17840,13 +18282,13 @@
   <p:clrMapOvr>
     <a:masterClrMapping/>
   </p:clrMapOvr>
-  <mc:AlternateContent xmlns:mc="http://schemas.openxmlformats.org/markup-compatibility/2006" xmlns:p14="http://schemas.microsoft.com/office/powerpoint/2010/main">
-    <mc:Choice Requires="p14">
-      <p:transition>
+  <mc:AlternateContent xmlns:mc="http://schemas.openxmlformats.org/markup-compatibility/2006">
+    <mc:Choice xmlns:p14="http://schemas.microsoft.com/office/powerpoint/2010/main" Requires="p14">
+      <p:transition p14:dur="200">
         <p14:flythrough/>
       </p:transition>
     </mc:Choice>
-    <mc:Fallback xmlns="">
+    <mc:Fallback>
       <p:transition>
         <p:fade/>
       </p:transition>
@@ -18014,13 +18456,13 @@
   <p:clrMapOvr>
     <a:masterClrMapping/>
   </p:clrMapOvr>
-  <mc:AlternateContent xmlns:mc="http://schemas.openxmlformats.org/markup-compatibility/2006" xmlns:p14="http://schemas.microsoft.com/office/powerpoint/2010/main">
-    <mc:Choice Requires="p14">
-      <p:transition>
+  <mc:AlternateContent xmlns:mc="http://schemas.openxmlformats.org/markup-compatibility/2006">
+    <mc:Choice xmlns:p14="http://schemas.microsoft.com/office/powerpoint/2010/main" Requires="p14">
+      <p:transition p14:dur="200">
         <p14:flythrough/>
       </p:transition>
     </mc:Choice>
-    <mc:Fallback xmlns="">
+    <mc:Fallback>
       <p:transition>
         <p:fade/>
       </p:transition>
@@ -18029,9 +18471,494 @@
   <p:timing>
     <p:tnLst>
       <p:par>
-        <p:cTn id="1" dur="indefinite" restart="never" nodeType="tmRoot"/>
+        <p:cTn id="1" dur="indefinite" restart="never" nodeType="tmRoot">
+          <p:childTnLst>
+            <p:seq concurrent="1" nextAc="seek">
+              <p:cTn id="2" dur="indefinite" nodeType="mainSeq">
+                <p:childTnLst>
+                  <p:par>
+                    <p:cTn id="3" fill="hold">
+                      <p:stCondLst>
+                        <p:cond delay="indefinite"/>
+                      </p:stCondLst>
+                      <p:childTnLst>
+                        <p:par>
+                          <p:cTn id="4" fill="hold">
+                            <p:stCondLst>
+                              <p:cond delay="0"/>
+                            </p:stCondLst>
+                            <p:childTnLst>
+                              <p:par>
+                                <p:cTn id="5" presetID="10" presetClass="entr" presetSubtype="0" fill="hold" grpId="0" nodeType="clickEffect">
+                                  <p:stCondLst>
+                                    <p:cond delay="0"/>
+                                  </p:stCondLst>
+                                  <p:childTnLst>
+                                    <p:set>
+                                      <p:cBhvr>
+                                        <p:cTn id="6" dur="1" fill="hold">
+                                          <p:stCondLst>
+                                            <p:cond delay="0"/>
+                                          </p:stCondLst>
+                                        </p:cTn>
+                                        <p:tgtEl>
+                                          <p:spTgt spid="3">
+                                            <p:txEl>
+                                              <p:pRg st="0" end="0"/>
+                                            </p:txEl>
+                                          </p:spTgt>
+                                        </p:tgtEl>
+                                        <p:attrNameLst>
+                                          <p:attrName>style.visibility</p:attrName>
+                                        </p:attrNameLst>
+                                      </p:cBhvr>
+                                      <p:to>
+                                        <p:strVal val="visible"/>
+                                      </p:to>
+                                    </p:set>
+                                    <p:animEffect transition="in" filter="fade">
+                                      <p:cBhvr>
+                                        <p:cTn id="7" dur="500"/>
+                                        <p:tgtEl>
+                                          <p:spTgt spid="3">
+                                            <p:txEl>
+                                              <p:pRg st="0" end="0"/>
+                                            </p:txEl>
+                                          </p:spTgt>
+                                        </p:tgtEl>
+                                      </p:cBhvr>
+                                    </p:animEffect>
+                                  </p:childTnLst>
+                                </p:cTn>
+                              </p:par>
+                              <p:par>
+                                <p:cTn id="8" presetID="10" presetClass="entr" presetSubtype="0" fill="hold" grpId="0" nodeType="withEffect">
+                                  <p:stCondLst>
+                                    <p:cond delay="0"/>
+                                  </p:stCondLst>
+                                  <p:childTnLst>
+                                    <p:set>
+                                      <p:cBhvr>
+                                        <p:cTn id="9" dur="1" fill="hold">
+                                          <p:stCondLst>
+                                            <p:cond delay="0"/>
+                                          </p:stCondLst>
+                                        </p:cTn>
+                                        <p:tgtEl>
+                                          <p:spTgt spid="3">
+                                            <p:txEl>
+                                              <p:pRg st="1" end="1"/>
+                                            </p:txEl>
+                                          </p:spTgt>
+                                        </p:tgtEl>
+                                        <p:attrNameLst>
+                                          <p:attrName>style.visibility</p:attrName>
+                                        </p:attrNameLst>
+                                      </p:cBhvr>
+                                      <p:to>
+                                        <p:strVal val="visible"/>
+                                      </p:to>
+                                    </p:set>
+                                    <p:animEffect transition="in" filter="fade">
+                                      <p:cBhvr>
+                                        <p:cTn id="10" dur="500"/>
+                                        <p:tgtEl>
+                                          <p:spTgt spid="3">
+                                            <p:txEl>
+                                              <p:pRg st="1" end="1"/>
+                                            </p:txEl>
+                                          </p:spTgt>
+                                        </p:tgtEl>
+                                      </p:cBhvr>
+                                    </p:animEffect>
+                                  </p:childTnLst>
+                                </p:cTn>
+                              </p:par>
+                              <p:par>
+                                <p:cTn id="11" presetID="10" presetClass="entr" presetSubtype="0" fill="hold" grpId="0" nodeType="withEffect">
+                                  <p:stCondLst>
+                                    <p:cond delay="0"/>
+                                  </p:stCondLst>
+                                  <p:childTnLst>
+                                    <p:set>
+                                      <p:cBhvr>
+                                        <p:cTn id="12" dur="1" fill="hold">
+                                          <p:stCondLst>
+                                            <p:cond delay="0"/>
+                                          </p:stCondLst>
+                                        </p:cTn>
+                                        <p:tgtEl>
+                                          <p:spTgt spid="3">
+                                            <p:txEl>
+                                              <p:pRg st="2" end="2"/>
+                                            </p:txEl>
+                                          </p:spTgt>
+                                        </p:tgtEl>
+                                        <p:attrNameLst>
+                                          <p:attrName>style.visibility</p:attrName>
+                                        </p:attrNameLst>
+                                      </p:cBhvr>
+                                      <p:to>
+                                        <p:strVal val="visible"/>
+                                      </p:to>
+                                    </p:set>
+                                    <p:animEffect transition="in" filter="fade">
+                                      <p:cBhvr>
+                                        <p:cTn id="13" dur="500"/>
+                                        <p:tgtEl>
+                                          <p:spTgt spid="3">
+                                            <p:txEl>
+                                              <p:pRg st="2" end="2"/>
+                                            </p:txEl>
+                                          </p:spTgt>
+                                        </p:tgtEl>
+                                      </p:cBhvr>
+                                    </p:animEffect>
+                                  </p:childTnLst>
+                                </p:cTn>
+                              </p:par>
+                            </p:childTnLst>
+                          </p:cTn>
+                        </p:par>
+                      </p:childTnLst>
+                    </p:cTn>
+                  </p:par>
+                  <p:par>
+                    <p:cTn id="14" fill="hold">
+                      <p:stCondLst>
+                        <p:cond delay="indefinite"/>
+                      </p:stCondLst>
+                      <p:childTnLst>
+                        <p:par>
+                          <p:cTn id="15" fill="hold">
+                            <p:stCondLst>
+                              <p:cond delay="0"/>
+                            </p:stCondLst>
+                            <p:childTnLst>
+                              <p:par>
+                                <p:cTn id="16" presetID="10" presetClass="entr" presetSubtype="0" fill="hold" grpId="0" nodeType="clickEffect">
+                                  <p:stCondLst>
+                                    <p:cond delay="0"/>
+                                  </p:stCondLst>
+                                  <p:childTnLst>
+                                    <p:set>
+                                      <p:cBhvr>
+                                        <p:cTn id="17" dur="1" fill="hold">
+                                          <p:stCondLst>
+                                            <p:cond delay="0"/>
+                                          </p:stCondLst>
+                                        </p:cTn>
+                                        <p:tgtEl>
+                                          <p:spTgt spid="3">
+                                            <p:txEl>
+                                              <p:pRg st="3" end="3"/>
+                                            </p:txEl>
+                                          </p:spTgt>
+                                        </p:tgtEl>
+                                        <p:attrNameLst>
+                                          <p:attrName>style.visibility</p:attrName>
+                                        </p:attrNameLst>
+                                      </p:cBhvr>
+                                      <p:to>
+                                        <p:strVal val="visible"/>
+                                      </p:to>
+                                    </p:set>
+                                    <p:animEffect transition="in" filter="fade">
+                                      <p:cBhvr>
+                                        <p:cTn id="18" dur="500"/>
+                                        <p:tgtEl>
+                                          <p:spTgt spid="3">
+                                            <p:txEl>
+                                              <p:pRg st="3" end="3"/>
+                                            </p:txEl>
+                                          </p:spTgt>
+                                        </p:tgtEl>
+                                      </p:cBhvr>
+                                    </p:animEffect>
+                                  </p:childTnLst>
+                                </p:cTn>
+                              </p:par>
+                            </p:childTnLst>
+                          </p:cTn>
+                        </p:par>
+                      </p:childTnLst>
+                    </p:cTn>
+                  </p:par>
+                  <p:par>
+                    <p:cTn id="19" fill="hold">
+                      <p:stCondLst>
+                        <p:cond delay="indefinite"/>
+                      </p:stCondLst>
+                      <p:childTnLst>
+                        <p:par>
+                          <p:cTn id="20" fill="hold">
+                            <p:stCondLst>
+                              <p:cond delay="0"/>
+                            </p:stCondLst>
+                            <p:childTnLst>
+                              <p:par>
+                                <p:cTn id="21" presetID="10" presetClass="entr" presetSubtype="0" fill="hold" grpId="0" nodeType="clickEffect">
+                                  <p:stCondLst>
+                                    <p:cond delay="0"/>
+                                  </p:stCondLst>
+                                  <p:childTnLst>
+                                    <p:set>
+                                      <p:cBhvr>
+                                        <p:cTn id="22" dur="1" fill="hold">
+                                          <p:stCondLst>
+                                            <p:cond delay="0"/>
+                                          </p:stCondLst>
+                                        </p:cTn>
+                                        <p:tgtEl>
+                                          <p:spTgt spid="3">
+                                            <p:txEl>
+                                              <p:pRg st="4" end="4"/>
+                                            </p:txEl>
+                                          </p:spTgt>
+                                        </p:tgtEl>
+                                        <p:attrNameLst>
+                                          <p:attrName>style.visibility</p:attrName>
+                                        </p:attrNameLst>
+                                      </p:cBhvr>
+                                      <p:to>
+                                        <p:strVal val="visible"/>
+                                      </p:to>
+                                    </p:set>
+                                    <p:animEffect transition="in" filter="fade">
+                                      <p:cBhvr>
+                                        <p:cTn id="23" dur="500"/>
+                                        <p:tgtEl>
+                                          <p:spTgt spid="3">
+                                            <p:txEl>
+                                              <p:pRg st="4" end="4"/>
+                                            </p:txEl>
+                                          </p:spTgt>
+                                        </p:tgtEl>
+                                      </p:cBhvr>
+                                    </p:animEffect>
+                                  </p:childTnLst>
+                                </p:cTn>
+                              </p:par>
+                              <p:par>
+                                <p:cTn id="24" presetID="10" presetClass="entr" presetSubtype="0" fill="hold" grpId="0" nodeType="withEffect">
+                                  <p:stCondLst>
+                                    <p:cond delay="0"/>
+                                  </p:stCondLst>
+                                  <p:childTnLst>
+                                    <p:set>
+                                      <p:cBhvr>
+                                        <p:cTn id="25" dur="1" fill="hold">
+                                          <p:stCondLst>
+                                            <p:cond delay="0"/>
+                                          </p:stCondLst>
+                                        </p:cTn>
+                                        <p:tgtEl>
+                                          <p:spTgt spid="3">
+                                            <p:txEl>
+                                              <p:pRg st="5" end="5"/>
+                                            </p:txEl>
+                                          </p:spTgt>
+                                        </p:tgtEl>
+                                        <p:attrNameLst>
+                                          <p:attrName>style.visibility</p:attrName>
+                                        </p:attrNameLst>
+                                      </p:cBhvr>
+                                      <p:to>
+                                        <p:strVal val="visible"/>
+                                      </p:to>
+                                    </p:set>
+                                    <p:animEffect transition="in" filter="fade">
+                                      <p:cBhvr>
+                                        <p:cTn id="26" dur="500"/>
+                                        <p:tgtEl>
+                                          <p:spTgt spid="3">
+                                            <p:txEl>
+                                              <p:pRg st="5" end="5"/>
+                                            </p:txEl>
+                                          </p:spTgt>
+                                        </p:tgtEl>
+                                      </p:cBhvr>
+                                    </p:animEffect>
+                                  </p:childTnLst>
+                                </p:cTn>
+                              </p:par>
+                            </p:childTnLst>
+                          </p:cTn>
+                        </p:par>
+                      </p:childTnLst>
+                    </p:cTn>
+                  </p:par>
+                  <p:par>
+                    <p:cTn id="27" fill="hold">
+                      <p:stCondLst>
+                        <p:cond delay="indefinite"/>
+                      </p:stCondLst>
+                      <p:childTnLst>
+                        <p:par>
+                          <p:cTn id="28" fill="hold">
+                            <p:stCondLst>
+                              <p:cond delay="0"/>
+                            </p:stCondLst>
+                            <p:childTnLst>
+                              <p:par>
+                                <p:cTn id="29" presetID="10" presetClass="entr" presetSubtype="0" fill="hold" grpId="0" nodeType="clickEffect">
+                                  <p:stCondLst>
+                                    <p:cond delay="0"/>
+                                  </p:stCondLst>
+                                  <p:childTnLst>
+                                    <p:set>
+                                      <p:cBhvr>
+                                        <p:cTn id="30" dur="1" fill="hold">
+                                          <p:stCondLst>
+                                            <p:cond delay="0"/>
+                                          </p:stCondLst>
+                                        </p:cTn>
+                                        <p:tgtEl>
+                                          <p:spTgt spid="3">
+                                            <p:txEl>
+                                              <p:pRg st="6" end="6"/>
+                                            </p:txEl>
+                                          </p:spTgt>
+                                        </p:tgtEl>
+                                        <p:attrNameLst>
+                                          <p:attrName>style.visibility</p:attrName>
+                                        </p:attrNameLst>
+                                      </p:cBhvr>
+                                      <p:to>
+                                        <p:strVal val="visible"/>
+                                      </p:to>
+                                    </p:set>
+                                    <p:animEffect transition="in" filter="fade">
+                                      <p:cBhvr>
+                                        <p:cTn id="31" dur="500"/>
+                                        <p:tgtEl>
+                                          <p:spTgt spid="3">
+                                            <p:txEl>
+                                              <p:pRg st="6" end="6"/>
+                                            </p:txEl>
+                                          </p:spTgt>
+                                        </p:tgtEl>
+                                      </p:cBhvr>
+                                    </p:animEffect>
+                                  </p:childTnLst>
+                                </p:cTn>
+                              </p:par>
+                              <p:par>
+                                <p:cTn id="32" presetID="10" presetClass="entr" presetSubtype="0" fill="hold" grpId="0" nodeType="withEffect">
+                                  <p:stCondLst>
+                                    <p:cond delay="0"/>
+                                  </p:stCondLst>
+                                  <p:childTnLst>
+                                    <p:set>
+                                      <p:cBhvr>
+                                        <p:cTn id="33" dur="1" fill="hold">
+                                          <p:stCondLst>
+                                            <p:cond delay="0"/>
+                                          </p:stCondLst>
+                                        </p:cTn>
+                                        <p:tgtEl>
+                                          <p:spTgt spid="3">
+                                            <p:txEl>
+                                              <p:pRg st="7" end="7"/>
+                                            </p:txEl>
+                                          </p:spTgt>
+                                        </p:tgtEl>
+                                        <p:attrNameLst>
+                                          <p:attrName>style.visibility</p:attrName>
+                                        </p:attrNameLst>
+                                      </p:cBhvr>
+                                      <p:to>
+                                        <p:strVal val="visible"/>
+                                      </p:to>
+                                    </p:set>
+                                    <p:animEffect transition="in" filter="fade">
+                                      <p:cBhvr>
+                                        <p:cTn id="34" dur="500"/>
+                                        <p:tgtEl>
+                                          <p:spTgt spid="3">
+                                            <p:txEl>
+                                              <p:pRg st="7" end="7"/>
+                                            </p:txEl>
+                                          </p:spTgt>
+                                        </p:tgtEl>
+                                      </p:cBhvr>
+                                    </p:animEffect>
+                                  </p:childTnLst>
+                                </p:cTn>
+                              </p:par>
+                              <p:par>
+                                <p:cTn id="35" presetID="10" presetClass="entr" presetSubtype="0" fill="hold" grpId="0" nodeType="withEffect">
+                                  <p:stCondLst>
+                                    <p:cond delay="0"/>
+                                  </p:stCondLst>
+                                  <p:childTnLst>
+                                    <p:set>
+                                      <p:cBhvr>
+                                        <p:cTn id="36" dur="1" fill="hold">
+                                          <p:stCondLst>
+                                            <p:cond delay="0"/>
+                                          </p:stCondLst>
+                                        </p:cTn>
+                                        <p:tgtEl>
+                                          <p:spTgt spid="3">
+                                            <p:txEl>
+                                              <p:pRg st="8" end="8"/>
+                                            </p:txEl>
+                                          </p:spTgt>
+                                        </p:tgtEl>
+                                        <p:attrNameLst>
+                                          <p:attrName>style.visibility</p:attrName>
+                                        </p:attrNameLst>
+                                      </p:cBhvr>
+                                      <p:to>
+                                        <p:strVal val="visible"/>
+                                      </p:to>
+                                    </p:set>
+                                    <p:animEffect transition="in" filter="fade">
+                                      <p:cBhvr>
+                                        <p:cTn id="37" dur="500"/>
+                                        <p:tgtEl>
+                                          <p:spTgt spid="3">
+                                            <p:txEl>
+                                              <p:pRg st="8" end="8"/>
+                                            </p:txEl>
+                                          </p:spTgt>
+                                        </p:tgtEl>
+                                      </p:cBhvr>
+                                    </p:animEffect>
+                                  </p:childTnLst>
+                                </p:cTn>
+                              </p:par>
+                            </p:childTnLst>
+                          </p:cTn>
+                        </p:par>
+                      </p:childTnLst>
+                    </p:cTn>
+                  </p:par>
+                </p:childTnLst>
+              </p:cTn>
+              <p:prevCondLst>
+                <p:cond evt="onPrev" delay="0">
+                  <p:tgtEl>
+                    <p:sldTgt/>
+                  </p:tgtEl>
+                </p:cond>
+              </p:prevCondLst>
+              <p:nextCondLst>
+                <p:cond evt="onNext" delay="0">
+                  <p:tgtEl>
+                    <p:sldTgt/>
+                  </p:tgtEl>
+                </p:cond>
+              </p:nextCondLst>
+            </p:seq>
+          </p:childTnLst>
+        </p:cTn>
       </p:par>
     </p:tnLst>
+    <p:bldLst>
+      <p:bldP spid="3" grpId="0" build="p"/>
+    </p:bldLst>
   </p:timing>
 </p:sld>
 </file>
@@ -18138,13 +19065,13 @@
   <p:clrMapOvr>
     <a:masterClrMapping/>
   </p:clrMapOvr>
-  <mc:AlternateContent xmlns:mc="http://schemas.openxmlformats.org/markup-compatibility/2006" xmlns:p14="http://schemas.microsoft.com/office/powerpoint/2010/main">
-    <mc:Choice Requires="p14">
-      <p:transition>
+  <mc:AlternateContent xmlns:mc="http://schemas.openxmlformats.org/markup-compatibility/2006">
+    <mc:Choice xmlns:p14="http://schemas.microsoft.com/office/powerpoint/2010/main" Requires="p14">
+      <p:transition p14:dur="200">
         <p14:flythrough/>
       </p:transition>
     </mc:Choice>
-    <mc:Fallback xmlns="">
+    <mc:Fallback>
       <p:transition>
         <p:fade/>
       </p:transition>
@@ -18252,13 +19179,13 @@
   <p:clrMapOvr>
     <a:masterClrMapping/>
   </p:clrMapOvr>
-  <mc:AlternateContent xmlns:mc="http://schemas.openxmlformats.org/markup-compatibility/2006" xmlns:p14="http://schemas.microsoft.com/office/powerpoint/2010/main">
-    <mc:Choice Requires="p14">
-      <p:transition>
+  <mc:AlternateContent xmlns:mc="http://schemas.openxmlformats.org/markup-compatibility/2006">
+    <mc:Choice xmlns:p14="http://schemas.microsoft.com/office/powerpoint/2010/main" Requires="p14">
+      <p:transition p14:dur="200">
         <p14:flythrough/>
       </p:transition>
     </mc:Choice>
-    <mc:Fallback xmlns="">
+    <mc:Fallback>
       <p:transition>
         <p:fade/>
       </p:transition>
@@ -18267,9 +19194,279 @@
   <p:timing>
     <p:tnLst>
       <p:par>
-        <p:cTn id="1" dur="indefinite" restart="never" nodeType="tmRoot"/>
+        <p:cTn id="1" dur="indefinite" restart="never" nodeType="tmRoot">
+          <p:childTnLst>
+            <p:seq concurrent="1" nextAc="seek">
+              <p:cTn id="2" dur="indefinite" nodeType="mainSeq">
+                <p:childTnLst>
+                  <p:par>
+                    <p:cTn id="3" fill="hold">
+                      <p:stCondLst>
+                        <p:cond delay="indefinite"/>
+                      </p:stCondLst>
+                      <p:childTnLst>
+                        <p:par>
+                          <p:cTn id="4" fill="hold">
+                            <p:stCondLst>
+                              <p:cond delay="0"/>
+                            </p:stCondLst>
+                            <p:childTnLst>
+                              <p:par>
+                                <p:cTn id="5" presetID="10" presetClass="entr" presetSubtype="0" fill="hold" grpId="0" nodeType="clickEffect">
+                                  <p:stCondLst>
+                                    <p:cond delay="0"/>
+                                  </p:stCondLst>
+                                  <p:childTnLst>
+                                    <p:set>
+                                      <p:cBhvr>
+                                        <p:cTn id="6" dur="1" fill="hold">
+                                          <p:stCondLst>
+                                            <p:cond delay="0"/>
+                                          </p:stCondLst>
+                                        </p:cTn>
+                                        <p:tgtEl>
+                                          <p:spTgt spid="3">
+                                            <p:txEl>
+                                              <p:pRg st="0" end="0"/>
+                                            </p:txEl>
+                                          </p:spTgt>
+                                        </p:tgtEl>
+                                        <p:attrNameLst>
+                                          <p:attrName>style.visibility</p:attrName>
+                                        </p:attrNameLst>
+                                      </p:cBhvr>
+                                      <p:to>
+                                        <p:strVal val="visible"/>
+                                      </p:to>
+                                    </p:set>
+                                    <p:animEffect transition="in" filter="fade">
+                                      <p:cBhvr>
+                                        <p:cTn id="7" dur="500"/>
+                                        <p:tgtEl>
+                                          <p:spTgt spid="3">
+                                            <p:txEl>
+                                              <p:pRg st="0" end="0"/>
+                                            </p:txEl>
+                                          </p:spTgt>
+                                        </p:tgtEl>
+                                      </p:cBhvr>
+                                    </p:animEffect>
+                                  </p:childTnLst>
+                                </p:cTn>
+                              </p:par>
+                            </p:childTnLst>
+                          </p:cTn>
+                        </p:par>
+                      </p:childTnLst>
+                    </p:cTn>
+                  </p:par>
+                  <p:par>
+                    <p:cTn id="8" fill="hold">
+                      <p:stCondLst>
+                        <p:cond delay="indefinite"/>
+                      </p:stCondLst>
+                      <p:childTnLst>
+                        <p:par>
+                          <p:cTn id="9" fill="hold">
+                            <p:stCondLst>
+                              <p:cond delay="0"/>
+                            </p:stCondLst>
+                            <p:childTnLst>
+                              <p:par>
+                                <p:cTn id="10" presetID="10" presetClass="entr" presetSubtype="0" fill="hold" grpId="0" nodeType="clickEffect">
+                                  <p:stCondLst>
+                                    <p:cond delay="0"/>
+                                  </p:stCondLst>
+                                  <p:childTnLst>
+                                    <p:set>
+                                      <p:cBhvr>
+                                        <p:cTn id="11" dur="1" fill="hold">
+                                          <p:stCondLst>
+                                            <p:cond delay="0"/>
+                                          </p:stCondLst>
+                                        </p:cTn>
+                                        <p:tgtEl>
+                                          <p:spTgt spid="3">
+                                            <p:txEl>
+                                              <p:pRg st="1" end="1"/>
+                                            </p:txEl>
+                                          </p:spTgt>
+                                        </p:tgtEl>
+                                        <p:attrNameLst>
+                                          <p:attrName>style.visibility</p:attrName>
+                                        </p:attrNameLst>
+                                      </p:cBhvr>
+                                      <p:to>
+                                        <p:strVal val="visible"/>
+                                      </p:to>
+                                    </p:set>
+                                    <p:animEffect transition="in" filter="fade">
+                                      <p:cBhvr>
+                                        <p:cTn id="12" dur="500"/>
+                                        <p:tgtEl>
+                                          <p:spTgt spid="3">
+                                            <p:txEl>
+                                              <p:pRg st="1" end="1"/>
+                                            </p:txEl>
+                                          </p:spTgt>
+                                        </p:tgtEl>
+                                      </p:cBhvr>
+                                    </p:animEffect>
+                                  </p:childTnLst>
+                                </p:cTn>
+                              </p:par>
+                            </p:childTnLst>
+                          </p:cTn>
+                        </p:par>
+                      </p:childTnLst>
+                    </p:cTn>
+                  </p:par>
+                  <p:par>
+                    <p:cTn id="13" fill="hold">
+                      <p:stCondLst>
+                        <p:cond delay="indefinite"/>
+                      </p:stCondLst>
+                      <p:childTnLst>
+                        <p:par>
+                          <p:cTn id="14" fill="hold">
+                            <p:stCondLst>
+                              <p:cond delay="0"/>
+                            </p:stCondLst>
+                            <p:childTnLst>
+                              <p:par>
+                                <p:cTn id="15" presetID="10" presetClass="entr" presetSubtype="0" fill="hold" grpId="0" nodeType="clickEffect">
+                                  <p:stCondLst>
+                                    <p:cond delay="0"/>
+                                  </p:stCondLst>
+                                  <p:childTnLst>
+                                    <p:set>
+                                      <p:cBhvr>
+                                        <p:cTn id="16" dur="1" fill="hold">
+                                          <p:stCondLst>
+                                            <p:cond delay="0"/>
+                                          </p:stCondLst>
+                                        </p:cTn>
+                                        <p:tgtEl>
+                                          <p:spTgt spid="3">
+                                            <p:txEl>
+                                              <p:pRg st="2" end="2"/>
+                                            </p:txEl>
+                                          </p:spTgt>
+                                        </p:tgtEl>
+                                        <p:attrNameLst>
+                                          <p:attrName>style.visibility</p:attrName>
+                                        </p:attrNameLst>
+                                      </p:cBhvr>
+                                      <p:to>
+                                        <p:strVal val="visible"/>
+                                      </p:to>
+                                    </p:set>
+                                    <p:animEffect transition="in" filter="fade">
+                                      <p:cBhvr>
+                                        <p:cTn id="17" dur="500"/>
+                                        <p:tgtEl>
+                                          <p:spTgt spid="3">
+                                            <p:txEl>
+                                              <p:pRg st="2" end="2"/>
+                                            </p:txEl>
+                                          </p:spTgt>
+                                        </p:tgtEl>
+                                      </p:cBhvr>
+                                    </p:animEffect>
+                                  </p:childTnLst>
+                                </p:cTn>
+                              </p:par>
+                            </p:childTnLst>
+                          </p:cTn>
+                        </p:par>
+                      </p:childTnLst>
+                    </p:cTn>
+                  </p:par>
+                  <p:par>
+                    <p:cTn id="18" fill="hold">
+                      <p:stCondLst>
+                        <p:cond delay="indefinite"/>
+                      </p:stCondLst>
+                      <p:childTnLst>
+                        <p:par>
+                          <p:cTn id="19" fill="hold">
+                            <p:stCondLst>
+                              <p:cond delay="0"/>
+                            </p:stCondLst>
+                            <p:childTnLst>
+                              <p:par>
+                                <p:cTn id="20" presetID="10" presetClass="entr" presetSubtype="0" fill="hold" grpId="0" nodeType="clickEffect">
+                                  <p:stCondLst>
+                                    <p:cond delay="0"/>
+                                  </p:stCondLst>
+                                  <p:childTnLst>
+                                    <p:set>
+                                      <p:cBhvr>
+                                        <p:cTn id="21" dur="1" fill="hold">
+                                          <p:stCondLst>
+                                            <p:cond delay="0"/>
+                                          </p:stCondLst>
+                                        </p:cTn>
+                                        <p:tgtEl>
+                                          <p:spTgt spid="3">
+                                            <p:txEl>
+                                              <p:pRg st="3" end="3"/>
+                                            </p:txEl>
+                                          </p:spTgt>
+                                        </p:tgtEl>
+                                        <p:attrNameLst>
+                                          <p:attrName>style.visibility</p:attrName>
+                                        </p:attrNameLst>
+                                      </p:cBhvr>
+                                      <p:to>
+                                        <p:strVal val="visible"/>
+                                      </p:to>
+                                    </p:set>
+                                    <p:animEffect transition="in" filter="fade">
+                                      <p:cBhvr>
+                                        <p:cTn id="22" dur="500"/>
+                                        <p:tgtEl>
+                                          <p:spTgt spid="3">
+                                            <p:txEl>
+                                              <p:pRg st="3" end="3"/>
+                                            </p:txEl>
+                                          </p:spTgt>
+                                        </p:tgtEl>
+                                      </p:cBhvr>
+                                    </p:animEffect>
+                                  </p:childTnLst>
+                                </p:cTn>
+                              </p:par>
+                            </p:childTnLst>
+                          </p:cTn>
+                        </p:par>
+                      </p:childTnLst>
+                    </p:cTn>
+                  </p:par>
+                </p:childTnLst>
+              </p:cTn>
+              <p:prevCondLst>
+                <p:cond evt="onPrev" delay="0">
+                  <p:tgtEl>
+                    <p:sldTgt/>
+                  </p:tgtEl>
+                </p:cond>
+              </p:prevCondLst>
+              <p:nextCondLst>
+                <p:cond evt="onNext" delay="0">
+                  <p:tgtEl>
+                    <p:sldTgt/>
+                  </p:tgtEl>
+                </p:cond>
+              </p:nextCondLst>
+            </p:seq>
+          </p:childTnLst>
+        </p:cTn>
       </p:par>
     </p:tnLst>
+    <p:bldLst>
+      <p:bldP spid="3" grpId="0" build="p"/>
+    </p:bldLst>
   </p:timing>
 </p:sld>
 </file>
@@ -18346,13 +19543,13 @@
   <p:clrMapOvr>
     <a:masterClrMapping/>
   </p:clrMapOvr>
-  <mc:AlternateContent xmlns:mc="http://schemas.openxmlformats.org/markup-compatibility/2006" xmlns:p14="http://schemas.microsoft.com/office/powerpoint/2010/main">
-    <mc:Choice Requires="p14">
-      <p:transition>
+  <mc:AlternateContent xmlns:mc="http://schemas.openxmlformats.org/markup-compatibility/2006">
+    <mc:Choice xmlns:p14="http://schemas.microsoft.com/office/powerpoint/2010/main" Requires="p14">
+      <p:transition p14:dur="200">
         <p14:flythrough/>
       </p:transition>
     </mc:Choice>
-    <mc:Fallback xmlns="">
+    <mc:Fallback>
       <p:transition>
         <p:fade/>
       </p:transition>
@@ -18501,12 +19698,466 @@
   <p:clrMapOvr>
     <a:masterClrMapping/>
   </p:clrMapOvr>
+  <mc:AlternateContent xmlns:mc="http://schemas.openxmlformats.org/markup-compatibility/2006">
+    <mc:Choice xmlns:p14="http://schemas.microsoft.com/office/powerpoint/2010/main" Requires="p14">
+      <p:transition p14:dur="200">
+        <p14:flythrough/>
+      </p:transition>
+    </mc:Choice>
+    <mc:Fallback>
+      <p:transition>
+        <p:fade/>
+      </p:transition>
+    </mc:Fallback>
+  </mc:AlternateContent>
   <p:timing>
     <p:tnLst>
       <p:par>
-        <p:cTn id="1" dur="indefinite" restart="never" nodeType="tmRoot"/>
+        <p:cTn id="1" dur="indefinite" restart="never" nodeType="tmRoot">
+          <p:childTnLst>
+            <p:seq concurrent="1" nextAc="seek">
+              <p:cTn id="2" dur="indefinite" nodeType="mainSeq">
+                <p:childTnLst>
+                  <p:par>
+                    <p:cTn id="3" fill="hold">
+                      <p:stCondLst>
+                        <p:cond delay="indefinite"/>
+                      </p:stCondLst>
+                      <p:childTnLst>
+                        <p:par>
+                          <p:cTn id="4" fill="hold">
+                            <p:stCondLst>
+                              <p:cond delay="0"/>
+                            </p:stCondLst>
+                            <p:childTnLst>
+                              <p:par>
+                                <p:cTn id="5" presetID="10" presetClass="entr" presetSubtype="0" fill="hold" grpId="0" nodeType="clickEffect">
+                                  <p:stCondLst>
+                                    <p:cond delay="0"/>
+                                  </p:stCondLst>
+                                  <p:childTnLst>
+                                    <p:set>
+                                      <p:cBhvr>
+                                        <p:cTn id="6" dur="1" fill="hold">
+                                          <p:stCondLst>
+                                            <p:cond delay="0"/>
+                                          </p:stCondLst>
+                                        </p:cTn>
+                                        <p:tgtEl>
+                                          <p:spTgt spid="3">
+                                            <p:txEl>
+                                              <p:pRg st="0" end="0"/>
+                                            </p:txEl>
+                                          </p:spTgt>
+                                        </p:tgtEl>
+                                        <p:attrNameLst>
+                                          <p:attrName>style.visibility</p:attrName>
+                                        </p:attrNameLst>
+                                      </p:cBhvr>
+                                      <p:to>
+                                        <p:strVal val="visible"/>
+                                      </p:to>
+                                    </p:set>
+                                    <p:animEffect transition="in" filter="fade">
+                                      <p:cBhvr>
+                                        <p:cTn id="7" dur="500"/>
+                                        <p:tgtEl>
+                                          <p:spTgt spid="3">
+                                            <p:txEl>
+                                              <p:pRg st="0" end="0"/>
+                                            </p:txEl>
+                                          </p:spTgt>
+                                        </p:tgtEl>
+                                      </p:cBhvr>
+                                    </p:animEffect>
+                                  </p:childTnLst>
+                                </p:cTn>
+                              </p:par>
+                            </p:childTnLst>
+                          </p:cTn>
+                        </p:par>
+                      </p:childTnLst>
+                    </p:cTn>
+                  </p:par>
+                  <p:par>
+                    <p:cTn id="8" fill="hold">
+                      <p:stCondLst>
+                        <p:cond delay="indefinite"/>
+                      </p:stCondLst>
+                      <p:childTnLst>
+                        <p:par>
+                          <p:cTn id="9" fill="hold">
+                            <p:stCondLst>
+                              <p:cond delay="0"/>
+                            </p:stCondLst>
+                            <p:childTnLst>
+                              <p:par>
+                                <p:cTn id="10" presetID="10" presetClass="entr" presetSubtype="0" fill="hold" grpId="0" nodeType="clickEffect">
+                                  <p:stCondLst>
+                                    <p:cond delay="0"/>
+                                  </p:stCondLst>
+                                  <p:childTnLst>
+                                    <p:set>
+                                      <p:cBhvr>
+                                        <p:cTn id="11" dur="1" fill="hold">
+                                          <p:stCondLst>
+                                            <p:cond delay="0"/>
+                                          </p:stCondLst>
+                                        </p:cTn>
+                                        <p:tgtEl>
+                                          <p:spTgt spid="3">
+                                            <p:txEl>
+                                              <p:pRg st="1" end="1"/>
+                                            </p:txEl>
+                                          </p:spTgt>
+                                        </p:tgtEl>
+                                        <p:attrNameLst>
+                                          <p:attrName>style.visibility</p:attrName>
+                                        </p:attrNameLst>
+                                      </p:cBhvr>
+                                      <p:to>
+                                        <p:strVal val="visible"/>
+                                      </p:to>
+                                    </p:set>
+                                    <p:animEffect transition="in" filter="fade">
+                                      <p:cBhvr>
+                                        <p:cTn id="12" dur="500"/>
+                                        <p:tgtEl>
+                                          <p:spTgt spid="3">
+                                            <p:txEl>
+                                              <p:pRg st="1" end="1"/>
+                                            </p:txEl>
+                                          </p:spTgt>
+                                        </p:tgtEl>
+                                      </p:cBhvr>
+                                    </p:animEffect>
+                                  </p:childTnLst>
+                                </p:cTn>
+                              </p:par>
+                            </p:childTnLst>
+                          </p:cTn>
+                        </p:par>
+                      </p:childTnLst>
+                    </p:cTn>
+                  </p:par>
+                  <p:par>
+                    <p:cTn id="13" fill="hold">
+                      <p:stCondLst>
+                        <p:cond delay="indefinite"/>
+                      </p:stCondLst>
+                      <p:childTnLst>
+                        <p:par>
+                          <p:cTn id="14" fill="hold">
+                            <p:stCondLst>
+                              <p:cond delay="0"/>
+                            </p:stCondLst>
+                            <p:childTnLst>
+                              <p:par>
+                                <p:cTn id="15" presetID="10" presetClass="entr" presetSubtype="0" fill="hold" grpId="0" nodeType="clickEffect">
+                                  <p:stCondLst>
+                                    <p:cond delay="0"/>
+                                  </p:stCondLst>
+                                  <p:childTnLst>
+                                    <p:set>
+                                      <p:cBhvr>
+                                        <p:cTn id="16" dur="1" fill="hold">
+                                          <p:stCondLst>
+                                            <p:cond delay="0"/>
+                                          </p:stCondLst>
+                                        </p:cTn>
+                                        <p:tgtEl>
+                                          <p:spTgt spid="3">
+                                            <p:txEl>
+                                              <p:pRg st="2" end="2"/>
+                                            </p:txEl>
+                                          </p:spTgt>
+                                        </p:tgtEl>
+                                        <p:attrNameLst>
+                                          <p:attrName>style.visibility</p:attrName>
+                                        </p:attrNameLst>
+                                      </p:cBhvr>
+                                      <p:to>
+                                        <p:strVal val="visible"/>
+                                      </p:to>
+                                    </p:set>
+                                    <p:animEffect transition="in" filter="fade">
+                                      <p:cBhvr>
+                                        <p:cTn id="17" dur="500"/>
+                                        <p:tgtEl>
+                                          <p:spTgt spid="3">
+                                            <p:txEl>
+                                              <p:pRg st="2" end="2"/>
+                                            </p:txEl>
+                                          </p:spTgt>
+                                        </p:tgtEl>
+                                      </p:cBhvr>
+                                    </p:animEffect>
+                                  </p:childTnLst>
+                                </p:cTn>
+                              </p:par>
+                            </p:childTnLst>
+                          </p:cTn>
+                        </p:par>
+                      </p:childTnLst>
+                    </p:cTn>
+                  </p:par>
+                  <p:par>
+                    <p:cTn id="18" fill="hold">
+                      <p:stCondLst>
+                        <p:cond delay="indefinite"/>
+                      </p:stCondLst>
+                      <p:childTnLst>
+                        <p:par>
+                          <p:cTn id="19" fill="hold">
+                            <p:stCondLst>
+                              <p:cond delay="0"/>
+                            </p:stCondLst>
+                            <p:childTnLst>
+                              <p:par>
+                                <p:cTn id="20" presetID="10" presetClass="entr" presetSubtype="0" fill="hold" grpId="0" nodeType="clickEffect">
+                                  <p:stCondLst>
+                                    <p:cond delay="0"/>
+                                  </p:stCondLst>
+                                  <p:childTnLst>
+                                    <p:set>
+                                      <p:cBhvr>
+                                        <p:cTn id="21" dur="1" fill="hold">
+                                          <p:stCondLst>
+                                            <p:cond delay="0"/>
+                                          </p:stCondLst>
+                                        </p:cTn>
+                                        <p:tgtEl>
+                                          <p:spTgt spid="3">
+                                            <p:txEl>
+                                              <p:pRg st="3" end="3"/>
+                                            </p:txEl>
+                                          </p:spTgt>
+                                        </p:tgtEl>
+                                        <p:attrNameLst>
+                                          <p:attrName>style.visibility</p:attrName>
+                                        </p:attrNameLst>
+                                      </p:cBhvr>
+                                      <p:to>
+                                        <p:strVal val="visible"/>
+                                      </p:to>
+                                    </p:set>
+                                    <p:animEffect transition="in" filter="fade">
+                                      <p:cBhvr>
+                                        <p:cTn id="22" dur="500"/>
+                                        <p:tgtEl>
+                                          <p:spTgt spid="3">
+                                            <p:txEl>
+                                              <p:pRg st="3" end="3"/>
+                                            </p:txEl>
+                                          </p:spTgt>
+                                        </p:tgtEl>
+                                      </p:cBhvr>
+                                    </p:animEffect>
+                                  </p:childTnLst>
+                                </p:cTn>
+                              </p:par>
+                              <p:par>
+                                <p:cTn id="23" presetID="10" presetClass="entr" presetSubtype="0" fill="hold" grpId="0" nodeType="withEffect">
+                                  <p:stCondLst>
+                                    <p:cond delay="0"/>
+                                  </p:stCondLst>
+                                  <p:childTnLst>
+                                    <p:set>
+                                      <p:cBhvr>
+                                        <p:cTn id="24" dur="1" fill="hold">
+                                          <p:stCondLst>
+                                            <p:cond delay="0"/>
+                                          </p:stCondLst>
+                                        </p:cTn>
+                                        <p:tgtEl>
+                                          <p:spTgt spid="3">
+                                            <p:txEl>
+                                              <p:pRg st="4" end="4"/>
+                                            </p:txEl>
+                                          </p:spTgt>
+                                        </p:tgtEl>
+                                        <p:attrNameLst>
+                                          <p:attrName>style.visibility</p:attrName>
+                                        </p:attrNameLst>
+                                      </p:cBhvr>
+                                      <p:to>
+                                        <p:strVal val="visible"/>
+                                      </p:to>
+                                    </p:set>
+                                    <p:animEffect transition="in" filter="fade">
+                                      <p:cBhvr>
+                                        <p:cTn id="25" dur="500"/>
+                                        <p:tgtEl>
+                                          <p:spTgt spid="3">
+                                            <p:txEl>
+                                              <p:pRg st="4" end="4"/>
+                                            </p:txEl>
+                                          </p:spTgt>
+                                        </p:tgtEl>
+                                      </p:cBhvr>
+                                    </p:animEffect>
+                                  </p:childTnLst>
+                                </p:cTn>
+                              </p:par>
+                              <p:par>
+                                <p:cTn id="26" presetID="10" presetClass="entr" presetSubtype="0" fill="hold" grpId="0" nodeType="withEffect">
+                                  <p:stCondLst>
+                                    <p:cond delay="0"/>
+                                  </p:stCondLst>
+                                  <p:childTnLst>
+                                    <p:set>
+                                      <p:cBhvr>
+                                        <p:cTn id="27" dur="1" fill="hold">
+                                          <p:stCondLst>
+                                            <p:cond delay="0"/>
+                                          </p:stCondLst>
+                                        </p:cTn>
+                                        <p:tgtEl>
+                                          <p:spTgt spid="3">
+                                            <p:txEl>
+                                              <p:pRg st="5" end="5"/>
+                                            </p:txEl>
+                                          </p:spTgt>
+                                        </p:tgtEl>
+                                        <p:attrNameLst>
+                                          <p:attrName>style.visibility</p:attrName>
+                                        </p:attrNameLst>
+                                      </p:cBhvr>
+                                      <p:to>
+                                        <p:strVal val="visible"/>
+                                      </p:to>
+                                    </p:set>
+                                    <p:animEffect transition="in" filter="fade">
+                                      <p:cBhvr>
+                                        <p:cTn id="28" dur="500"/>
+                                        <p:tgtEl>
+                                          <p:spTgt spid="3">
+                                            <p:txEl>
+                                              <p:pRg st="5" end="5"/>
+                                            </p:txEl>
+                                          </p:spTgt>
+                                        </p:tgtEl>
+                                      </p:cBhvr>
+                                    </p:animEffect>
+                                  </p:childTnLst>
+                                </p:cTn>
+                              </p:par>
+                              <p:par>
+                                <p:cTn id="29" presetID="10" presetClass="entr" presetSubtype="0" fill="hold" grpId="0" nodeType="withEffect">
+                                  <p:stCondLst>
+                                    <p:cond delay="0"/>
+                                  </p:stCondLst>
+                                  <p:childTnLst>
+                                    <p:set>
+                                      <p:cBhvr>
+                                        <p:cTn id="30" dur="1" fill="hold">
+                                          <p:stCondLst>
+                                            <p:cond delay="0"/>
+                                          </p:stCondLst>
+                                        </p:cTn>
+                                        <p:tgtEl>
+                                          <p:spTgt spid="3">
+                                            <p:txEl>
+                                              <p:pRg st="6" end="6"/>
+                                            </p:txEl>
+                                          </p:spTgt>
+                                        </p:tgtEl>
+                                        <p:attrNameLst>
+                                          <p:attrName>style.visibility</p:attrName>
+                                        </p:attrNameLst>
+                                      </p:cBhvr>
+                                      <p:to>
+                                        <p:strVal val="visible"/>
+                                      </p:to>
+                                    </p:set>
+                                    <p:animEffect transition="in" filter="fade">
+                                      <p:cBhvr>
+                                        <p:cTn id="31" dur="500"/>
+                                        <p:tgtEl>
+                                          <p:spTgt spid="3">
+                                            <p:txEl>
+                                              <p:pRg st="6" end="6"/>
+                                            </p:txEl>
+                                          </p:spTgt>
+                                        </p:tgtEl>
+                                      </p:cBhvr>
+                                    </p:animEffect>
+                                  </p:childTnLst>
+                                </p:cTn>
+                              </p:par>
+                              <p:par>
+                                <p:cTn id="32" presetID="10" presetClass="entr" presetSubtype="0" fill="hold" grpId="0" nodeType="withEffect">
+                                  <p:stCondLst>
+                                    <p:cond delay="0"/>
+                                  </p:stCondLst>
+                                  <p:childTnLst>
+                                    <p:set>
+                                      <p:cBhvr>
+                                        <p:cTn id="33" dur="1" fill="hold">
+                                          <p:stCondLst>
+                                            <p:cond delay="0"/>
+                                          </p:stCondLst>
+                                        </p:cTn>
+                                        <p:tgtEl>
+                                          <p:spTgt spid="3">
+                                            <p:txEl>
+                                              <p:pRg st="7" end="7"/>
+                                            </p:txEl>
+                                          </p:spTgt>
+                                        </p:tgtEl>
+                                        <p:attrNameLst>
+                                          <p:attrName>style.visibility</p:attrName>
+                                        </p:attrNameLst>
+                                      </p:cBhvr>
+                                      <p:to>
+                                        <p:strVal val="visible"/>
+                                      </p:to>
+                                    </p:set>
+                                    <p:animEffect transition="in" filter="fade">
+                                      <p:cBhvr>
+                                        <p:cTn id="34" dur="500"/>
+                                        <p:tgtEl>
+                                          <p:spTgt spid="3">
+                                            <p:txEl>
+                                              <p:pRg st="7" end="7"/>
+                                            </p:txEl>
+                                          </p:spTgt>
+                                        </p:tgtEl>
+                                      </p:cBhvr>
+                                    </p:animEffect>
+                                  </p:childTnLst>
+                                </p:cTn>
+                              </p:par>
+                            </p:childTnLst>
+                          </p:cTn>
+                        </p:par>
+                      </p:childTnLst>
+                    </p:cTn>
+                  </p:par>
+                </p:childTnLst>
+              </p:cTn>
+              <p:prevCondLst>
+                <p:cond evt="onPrev" delay="0">
+                  <p:tgtEl>
+                    <p:sldTgt/>
+                  </p:tgtEl>
+                </p:cond>
+              </p:prevCondLst>
+              <p:nextCondLst>
+                <p:cond evt="onNext" delay="0">
+                  <p:tgtEl>
+                    <p:sldTgt/>
+                  </p:tgtEl>
+                </p:cond>
+              </p:nextCondLst>
+            </p:seq>
+          </p:childTnLst>
+        </p:cTn>
       </p:par>
     </p:tnLst>
+    <p:bldLst>
+      <p:bldP spid="3" grpId="0" build="p"/>
+    </p:bldLst>
   </p:timing>
 </p:sld>
 </file>
@@ -18647,6 +20298,18 @@
   <p:clrMapOvr>
     <a:masterClrMapping/>
   </p:clrMapOvr>
+  <mc:AlternateContent xmlns:mc="http://schemas.openxmlformats.org/markup-compatibility/2006">
+    <mc:Choice xmlns:p14="http://schemas.microsoft.com/office/powerpoint/2010/main" Requires="p14">
+      <p:transition p14:dur="200">
+        <p14:flythrough/>
+      </p:transition>
+    </mc:Choice>
+    <mc:Fallback>
+      <p:transition>
+        <p:fade/>
+      </p:transition>
+    </mc:Fallback>
+  </mc:AlternateContent>
   <p:timing>
     <p:tnLst>
       <p:par>
@@ -18751,13 +20414,13 @@
   <p:clrMapOvr>
     <a:masterClrMapping/>
   </p:clrMapOvr>
-  <mc:AlternateContent xmlns:mc="http://schemas.openxmlformats.org/markup-compatibility/2006" xmlns:p14="http://schemas.microsoft.com/office/powerpoint/2010/main">
-    <mc:Choice Requires="p14">
-      <p:transition>
+  <mc:AlternateContent xmlns:mc="http://schemas.openxmlformats.org/markup-compatibility/2006">
+    <mc:Choice xmlns:p14="http://schemas.microsoft.com/office/powerpoint/2010/main" Requires="p14">
+      <p:transition p14:dur="200">
         <p14:flythrough/>
       </p:transition>
     </mc:Choice>
-    <mc:Fallback xmlns="">
+    <mc:Fallback>
       <p:transition>
         <p:fade/>
       </p:transition>
@@ -18845,6 +20508,18 @@
   <p:clrMapOvr>
     <a:masterClrMapping/>
   </p:clrMapOvr>
+  <mc:AlternateContent xmlns:mc="http://schemas.openxmlformats.org/markup-compatibility/2006">
+    <mc:Choice xmlns:p14="http://schemas.microsoft.com/office/powerpoint/2010/main" Requires="p14">
+      <p:transition p14:dur="200">
+        <p14:flythrough/>
+      </p:transition>
+    </mc:Choice>
+    <mc:Fallback>
+      <p:transition>
+        <p:fade/>
+      </p:transition>
+    </mc:Fallback>
+  </mc:AlternateContent>
   <p:timing>
     <p:tnLst>
       <p:par>
@@ -19021,13 +20696,13 @@
   <p:clrMapOvr>
     <a:masterClrMapping/>
   </p:clrMapOvr>
-  <mc:AlternateContent xmlns:mc="http://schemas.openxmlformats.org/markup-compatibility/2006" xmlns:p14="http://schemas.microsoft.com/office/powerpoint/2010/main">
-    <mc:Choice Requires="p14">
-      <p:transition>
+  <mc:AlternateContent xmlns:mc="http://schemas.openxmlformats.org/markup-compatibility/2006">
+    <mc:Choice xmlns:p14="http://schemas.microsoft.com/office/powerpoint/2010/main" Requires="p14">
+      <p:transition p14:dur="200">
         <p14:flythrough/>
       </p:transition>
     </mc:Choice>
-    <mc:Fallback xmlns="">
+    <mc:Fallback>
       <p:transition>
         <p:fade/>
       </p:transition>
@@ -19150,6 +20825,25 @@
   <p:clrMapOvr>
     <a:masterClrMapping/>
   </p:clrMapOvr>
+  <mc:AlternateContent xmlns:mc="http://schemas.openxmlformats.org/markup-compatibility/2006">
+    <mc:Choice xmlns:p14="http://schemas.microsoft.com/office/powerpoint/2010/main" Requires="p14">
+      <p:transition p14:dur="200">
+        <p14:flythrough/>
+      </p:transition>
+    </mc:Choice>
+    <mc:Fallback>
+      <p:transition>
+        <p:fade/>
+      </p:transition>
+    </mc:Fallback>
+  </mc:AlternateContent>
+  <p:timing>
+    <p:tnLst>
+      <p:par>
+        <p:cTn id="1" dur="indefinite" restart="never" nodeType="tmRoot"/>
+      </p:par>
+    </p:tnLst>
+  </p:timing>
 </p:sld>
 </file>
 
@@ -19292,6 +20986,18 @@
   <p:clrMapOvr>
     <a:masterClrMapping/>
   </p:clrMapOvr>
+  <mc:AlternateContent xmlns:mc="http://schemas.openxmlformats.org/markup-compatibility/2006">
+    <mc:Choice xmlns:p14="http://schemas.microsoft.com/office/powerpoint/2010/main" Requires="p14">
+      <p:transition p14:dur="200">
+        <p14:flythrough/>
+      </p:transition>
+    </mc:Choice>
+    <mc:Fallback>
+      <p:transition>
+        <p:fade/>
+      </p:transition>
+    </mc:Fallback>
+  </mc:AlternateContent>
   <p:timing>
     <p:tnLst>
       <p:par>
@@ -19487,6 +21193,25 @@
   <p:clrMapOvr>
     <a:masterClrMapping/>
   </p:clrMapOvr>
+  <mc:AlternateContent xmlns:mc="http://schemas.openxmlformats.org/markup-compatibility/2006">
+    <mc:Choice xmlns:p14="http://schemas.microsoft.com/office/powerpoint/2010/main" Requires="p14">
+      <p:transition p14:dur="200">
+        <p14:flythrough/>
+      </p:transition>
+    </mc:Choice>
+    <mc:Fallback>
+      <p:transition>
+        <p:fade/>
+      </p:transition>
+    </mc:Fallback>
+  </mc:AlternateContent>
+  <p:timing>
+    <p:tnLst>
+      <p:par>
+        <p:cTn id="1" dur="indefinite" restart="never" nodeType="tmRoot"/>
+      </p:par>
+    </p:tnLst>
+  </p:timing>
 </p:sld>
 </file>
 
@@ -19626,13 +21351,13 @@
   <p:clrMapOvr>
     <a:masterClrMapping/>
   </p:clrMapOvr>
-  <mc:AlternateContent xmlns:mc="http://schemas.openxmlformats.org/markup-compatibility/2006" xmlns:p14="http://schemas.microsoft.com/office/powerpoint/2010/main">
-    <mc:Choice Requires="p14">
-      <p:transition>
+  <mc:AlternateContent xmlns:mc="http://schemas.openxmlformats.org/markup-compatibility/2006">
+    <mc:Choice xmlns:p14="http://schemas.microsoft.com/office/powerpoint/2010/main" Requires="p14">
+      <p:transition p14:dur="200">
         <p14:flythrough/>
       </p:transition>
     </mc:Choice>
-    <mc:Fallback xmlns="">
+    <mc:Fallback>
       <p:transition>
         <p:fade/>
       </p:transition>
@@ -19734,6 +21459,18 @@
   <p:clrMapOvr>
     <a:masterClrMapping/>
   </p:clrMapOvr>
+  <mc:AlternateContent xmlns:mc="http://schemas.openxmlformats.org/markup-compatibility/2006">
+    <mc:Choice xmlns:p14="http://schemas.microsoft.com/office/powerpoint/2010/main" Requires="p14">
+      <p:transition p14:dur="200">
+        <p14:flythrough/>
+      </p:transition>
+    </mc:Choice>
+    <mc:Fallback>
+      <p:transition>
+        <p:fade/>
+      </p:transition>
+    </mc:Fallback>
+  </mc:AlternateContent>
   <p:timing>
     <p:tnLst>
       <p:par>
@@ -19819,13 +21556,13 @@
   <p:clrMapOvr>
     <a:masterClrMapping/>
   </p:clrMapOvr>
-  <mc:AlternateContent xmlns:mc="http://schemas.openxmlformats.org/markup-compatibility/2006" xmlns:p14="http://schemas.microsoft.com/office/powerpoint/2010/main">
-    <mc:Choice Requires="p14">
-      <p:transition>
+  <mc:AlternateContent xmlns:mc="http://schemas.openxmlformats.org/markup-compatibility/2006">
+    <mc:Choice xmlns:p14="http://schemas.microsoft.com/office/powerpoint/2010/main" Requires="p14">
+      <p:transition p14:dur="200">
         <p14:flythrough/>
       </p:transition>
     </mc:Choice>
-    <mc:Fallback xmlns="">
+    <mc:Fallback>
       <p:transition>
         <p:fade/>
       </p:transition>
@@ -19966,13 +21703,13 @@
   <p:clrMapOvr>
     <a:masterClrMapping/>
   </p:clrMapOvr>
-  <mc:AlternateContent xmlns:mc="http://schemas.openxmlformats.org/markup-compatibility/2006" xmlns:p14="http://schemas.microsoft.com/office/powerpoint/2010/main">
-    <mc:Choice Requires="p14">
-      <p:transition>
+  <mc:AlternateContent xmlns:mc="http://schemas.openxmlformats.org/markup-compatibility/2006">
+    <mc:Choice xmlns:p14="http://schemas.microsoft.com/office/powerpoint/2010/main" Requires="p14">
+      <p:transition p14:dur="200">
         <p14:flythrough/>
       </p:transition>
     </mc:Choice>
-    <mc:Fallback xmlns="">
+    <mc:Fallback>
       <p:transition>
         <p:fade/>
       </p:transition>
@@ -20067,13 +21804,13 @@
   <p:clrMapOvr>
     <a:masterClrMapping/>
   </p:clrMapOvr>
-  <mc:AlternateContent xmlns:mc="http://schemas.openxmlformats.org/markup-compatibility/2006" xmlns:p14="http://schemas.microsoft.com/office/powerpoint/2010/main">
-    <mc:Choice Requires="p14">
-      <p:transition>
+  <mc:AlternateContent xmlns:mc="http://schemas.openxmlformats.org/markup-compatibility/2006">
+    <mc:Choice xmlns:p14="http://schemas.microsoft.com/office/powerpoint/2010/main" Requires="p14">
+      <p:transition p14:dur="200">
         <p14:flythrough/>
       </p:transition>
     </mc:Choice>
-    <mc:Fallback xmlns="">
+    <mc:Fallback>
       <p:transition>
         <p:fade/>
       </p:transition>
@@ -20201,13 +21938,13 @@
   <p:clrMapOvr>
     <a:masterClrMapping/>
   </p:clrMapOvr>
-  <mc:AlternateContent xmlns:mc="http://schemas.openxmlformats.org/markup-compatibility/2006" xmlns:p14="http://schemas.microsoft.com/office/powerpoint/2010/main">
-    <mc:Choice Requires="p14">
-      <p:transition>
+  <mc:AlternateContent xmlns:mc="http://schemas.openxmlformats.org/markup-compatibility/2006">
+    <mc:Choice xmlns:p14="http://schemas.microsoft.com/office/powerpoint/2010/main" Requires="p14">
+      <p:transition p14:dur="200">
         <p14:flythrough/>
       </p:transition>
     </mc:Choice>
-    <mc:Fallback xmlns="">
+    <mc:Fallback>
       <p:transition>
         <p:fade/>
       </p:transition>
@@ -20216,9 +21953,365 @@
   <p:timing>
     <p:tnLst>
       <p:par>
-        <p:cTn id="1" dur="indefinite" restart="never" nodeType="tmRoot"/>
+        <p:cTn id="1" dur="indefinite" restart="never" nodeType="tmRoot">
+          <p:childTnLst>
+            <p:seq concurrent="1" nextAc="seek">
+              <p:cTn id="2" dur="indefinite" nodeType="mainSeq">
+                <p:childTnLst>
+                  <p:par>
+                    <p:cTn id="3" fill="hold">
+                      <p:stCondLst>
+                        <p:cond delay="indefinite"/>
+                      </p:stCondLst>
+                      <p:childTnLst>
+                        <p:par>
+                          <p:cTn id="4" fill="hold">
+                            <p:stCondLst>
+                              <p:cond delay="0"/>
+                            </p:stCondLst>
+                            <p:childTnLst>
+                              <p:par>
+                                <p:cTn id="5" presetID="10" presetClass="entr" presetSubtype="0" fill="hold" grpId="0" nodeType="clickEffect">
+                                  <p:stCondLst>
+                                    <p:cond delay="0"/>
+                                  </p:stCondLst>
+                                  <p:childTnLst>
+                                    <p:set>
+                                      <p:cBhvr>
+                                        <p:cTn id="6" dur="1" fill="hold">
+                                          <p:stCondLst>
+                                            <p:cond delay="0"/>
+                                          </p:stCondLst>
+                                        </p:cTn>
+                                        <p:tgtEl>
+                                          <p:spTgt spid="3">
+                                            <p:txEl>
+                                              <p:pRg st="0" end="0"/>
+                                            </p:txEl>
+                                          </p:spTgt>
+                                        </p:tgtEl>
+                                        <p:attrNameLst>
+                                          <p:attrName>style.visibility</p:attrName>
+                                        </p:attrNameLst>
+                                      </p:cBhvr>
+                                      <p:to>
+                                        <p:strVal val="visible"/>
+                                      </p:to>
+                                    </p:set>
+                                    <p:animEffect transition="in" filter="fade">
+                                      <p:cBhvr>
+                                        <p:cTn id="7" dur="500"/>
+                                        <p:tgtEl>
+                                          <p:spTgt spid="3">
+                                            <p:txEl>
+                                              <p:pRg st="0" end="0"/>
+                                            </p:txEl>
+                                          </p:spTgt>
+                                        </p:tgtEl>
+                                      </p:cBhvr>
+                                    </p:animEffect>
+                                  </p:childTnLst>
+                                </p:cTn>
+                              </p:par>
+                              <p:par>
+                                <p:cTn id="8" presetID="10" presetClass="entr" presetSubtype="0" fill="hold" grpId="0" nodeType="withEffect">
+                                  <p:stCondLst>
+                                    <p:cond delay="0"/>
+                                  </p:stCondLst>
+                                  <p:childTnLst>
+                                    <p:set>
+                                      <p:cBhvr>
+                                        <p:cTn id="9" dur="1" fill="hold">
+                                          <p:stCondLst>
+                                            <p:cond delay="0"/>
+                                          </p:stCondLst>
+                                        </p:cTn>
+                                        <p:tgtEl>
+                                          <p:spTgt spid="3">
+                                            <p:txEl>
+                                              <p:pRg st="1" end="1"/>
+                                            </p:txEl>
+                                          </p:spTgt>
+                                        </p:tgtEl>
+                                        <p:attrNameLst>
+                                          <p:attrName>style.visibility</p:attrName>
+                                        </p:attrNameLst>
+                                      </p:cBhvr>
+                                      <p:to>
+                                        <p:strVal val="visible"/>
+                                      </p:to>
+                                    </p:set>
+                                    <p:animEffect transition="in" filter="fade">
+                                      <p:cBhvr>
+                                        <p:cTn id="10" dur="500"/>
+                                        <p:tgtEl>
+                                          <p:spTgt spid="3">
+                                            <p:txEl>
+                                              <p:pRg st="1" end="1"/>
+                                            </p:txEl>
+                                          </p:spTgt>
+                                        </p:tgtEl>
+                                      </p:cBhvr>
+                                    </p:animEffect>
+                                  </p:childTnLst>
+                                </p:cTn>
+                              </p:par>
+                            </p:childTnLst>
+                          </p:cTn>
+                        </p:par>
+                      </p:childTnLst>
+                    </p:cTn>
+                  </p:par>
+                  <p:par>
+                    <p:cTn id="11" fill="hold">
+                      <p:stCondLst>
+                        <p:cond delay="indefinite"/>
+                      </p:stCondLst>
+                      <p:childTnLst>
+                        <p:par>
+                          <p:cTn id="12" fill="hold">
+                            <p:stCondLst>
+                              <p:cond delay="0"/>
+                            </p:stCondLst>
+                            <p:childTnLst>
+                              <p:par>
+                                <p:cTn id="13" presetID="10" presetClass="entr" presetSubtype="0" fill="hold" grpId="0" nodeType="clickEffect">
+                                  <p:stCondLst>
+                                    <p:cond delay="0"/>
+                                  </p:stCondLst>
+                                  <p:childTnLst>
+                                    <p:set>
+                                      <p:cBhvr>
+                                        <p:cTn id="14" dur="1" fill="hold">
+                                          <p:stCondLst>
+                                            <p:cond delay="0"/>
+                                          </p:stCondLst>
+                                        </p:cTn>
+                                        <p:tgtEl>
+                                          <p:spTgt spid="3">
+                                            <p:txEl>
+                                              <p:pRg st="2" end="2"/>
+                                            </p:txEl>
+                                          </p:spTgt>
+                                        </p:tgtEl>
+                                        <p:attrNameLst>
+                                          <p:attrName>style.visibility</p:attrName>
+                                        </p:attrNameLst>
+                                      </p:cBhvr>
+                                      <p:to>
+                                        <p:strVal val="visible"/>
+                                      </p:to>
+                                    </p:set>
+                                    <p:animEffect transition="in" filter="fade">
+                                      <p:cBhvr>
+                                        <p:cTn id="15" dur="500"/>
+                                        <p:tgtEl>
+                                          <p:spTgt spid="3">
+                                            <p:txEl>
+                                              <p:pRg st="2" end="2"/>
+                                            </p:txEl>
+                                          </p:spTgt>
+                                        </p:tgtEl>
+                                      </p:cBhvr>
+                                    </p:animEffect>
+                                  </p:childTnLst>
+                                </p:cTn>
+                              </p:par>
+                            </p:childTnLst>
+                          </p:cTn>
+                        </p:par>
+                      </p:childTnLst>
+                    </p:cTn>
+                  </p:par>
+                  <p:par>
+                    <p:cTn id="16" fill="hold">
+                      <p:stCondLst>
+                        <p:cond delay="indefinite"/>
+                      </p:stCondLst>
+                      <p:childTnLst>
+                        <p:par>
+                          <p:cTn id="17" fill="hold">
+                            <p:stCondLst>
+                              <p:cond delay="0"/>
+                            </p:stCondLst>
+                            <p:childTnLst>
+                              <p:par>
+                                <p:cTn id="18" presetID="10" presetClass="entr" presetSubtype="0" fill="hold" grpId="0" nodeType="clickEffect">
+                                  <p:stCondLst>
+                                    <p:cond delay="0"/>
+                                  </p:stCondLst>
+                                  <p:childTnLst>
+                                    <p:set>
+                                      <p:cBhvr>
+                                        <p:cTn id="19" dur="1" fill="hold">
+                                          <p:stCondLst>
+                                            <p:cond delay="0"/>
+                                          </p:stCondLst>
+                                        </p:cTn>
+                                        <p:tgtEl>
+                                          <p:spTgt spid="3">
+                                            <p:txEl>
+                                              <p:pRg st="3" end="3"/>
+                                            </p:txEl>
+                                          </p:spTgt>
+                                        </p:tgtEl>
+                                        <p:attrNameLst>
+                                          <p:attrName>style.visibility</p:attrName>
+                                        </p:attrNameLst>
+                                      </p:cBhvr>
+                                      <p:to>
+                                        <p:strVal val="visible"/>
+                                      </p:to>
+                                    </p:set>
+                                    <p:animEffect transition="in" filter="fade">
+                                      <p:cBhvr>
+                                        <p:cTn id="20" dur="500"/>
+                                        <p:tgtEl>
+                                          <p:spTgt spid="3">
+                                            <p:txEl>
+                                              <p:pRg st="3" end="3"/>
+                                            </p:txEl>
+                                          </p:spTgt>
+                                        </p:tgtEl>
+                                      </p:cBhvr>
+                                    </p:animEffect>
+                                  </p:childTnLst>
+                                </p:cTn>
+                              </p:par>
+                              <p:par>
+                                <p:cTn id="21" presetID="10" presetClass="entr" presetSubtype="0" fill="hold" grpId="0" nodeType="withEffect">
+                                  <p:stCondLst>
+                                    <p:cond delay="0"/>
+                                  </p:stCondLst>
+                                  <p:childTnLst>
+                                    <p:set>
+                                      <p:cBhvr>
+                                        <p:cTn id="22" dur="1" fill="hold">
+                                          <p:stCondLst>
+                                            <p:cond delay="0"/>
+                                          </p:stCondLst>
+                                        </p:cTn>
+                                        <p:tgtEl>
+                                          <p:spTgt spid="3">
+                                            <p:txEl>
+                                              <p:pRg st="4" end="4"/>
+                                            </p:txEl>
+                                          </p:spTgt>
+                                        </p:tgtEl>
+                                        <p:attrNameLst>
+                                          <p:attrName>style.visibility</p:attrName>
+                                        </p:attrNameLst>
+                                      </p:cBhvr>
+                                      <p:to>
+                                        <p:strVal val="visible"/>
+                                      </p:to>
+                                    </p:set>
+                                    <p:animEffect transition="in" filter="fade">
+                                      <p:cBhvr>
+                                        <p:cTn id="23" dur="500"/>
+                                        <p:tgtEl>
+                                          <p:spTgt spid="3">
+                                            <p:txEl>
+                                              <p:pRg st="4" end="4"/>
+                                            </p:txEl>
+                                          </p:spTgt>
+                                        </p:tgtEl>
+                                      </p:cBhvr>
+                                    </p:animEffect>
+                                  </p:childTnLst>
+                                </p:cTn>
+                              </p:par>
+                            </p:childTnLst>
+                          </p:cTn>
+                        </p:par>
+                      </p:childTnLst>
+                    </p:cTn>
+                  </p:par>
+                  <p:par>
+                    <p:cTn id="24" fill="hold">
+                      <p:stCondLst>
+                        <p:cond delay="indefinite"/>
+                      </p:stCondLst>
+                      <p:childTnLst>
+                        <p:par>
+                          <p:cTn id="25" fill="hold">
+                            <p:stCondLst>
+                              <p:cond delay="0"/>
+                            </p:stCondLst>
+                            <p:childTnLst>
+                              <p:par>
+                                <p:cTn id="26" presetID="10" presetClass="entr" presetSubtype="0" fill="hold" grpId="0" nodeType="clickEffect">
+                                  <p:stCondLst>
+                                    <p:cond delay="0"/>
+                                  </p:stCondLst>
+                                  <p:childTnLst>
+                                    <p:set>
+                                      <p:cBhvr>
+                                        <p:cTn id="27" dur="1" fill="hold">
+                                          <p:stCondLst>
+                                            <p:cond delay="0"/>
+                                          </p:stCondLst>
+                                        </p:cTn>
+                                        <p:tgtEl>
+                                          <p:spTgt spid="3">
+                                            <p:txEl>
+                                              <p:pRg st="5" end="5"/>
+                                            </p:txEl>
+                                          </p:spTgt>
+                                        </p:tgtEl>
+                                        <p:attrNameLst>
+                                          <p:attrName>style.visibility</p:attrName>
+                                        </p:attrNameLst>
+                                      </p:cBhvr>
+                                      <p:to>
+                                        <p:strVal val="visible"/>
+                                      </p:to>
+                                    </p:set>
+                                    <p:animEffect transition="in" filter="fade">
+                                      <p:cBhvr>
+                                        <p:cTn id="28" dur="500"/>
+                                        <p:tgtEl>
+                                          <p:spTgt spid="3">
+                                            <p:txEl>
+                                              <p:pRg st="5" end="5"/>
+                                            </p:txEl>
+                                          </p:spTgt>
+                                        </p:tgtEl>
+                                      </p:cBhvr>
+                                    </p:animEffect>
+                                  </p:childTnLst>
+                                </p:cTn>
+                              </p:par>
+                            </p:childTnLst>
+                          </p:cTn>
+                        </p:par>
+                      </p:childTnLst>
+                    </p:cTn>
+                  </p:par>
+                </p:childTnLst>
+              </p:cTn>
+              <p:prevCondLst>
+                <p:cond evt="onPrev" delay="0">
+                  <p:tgtEl>
+                    <p:sldTgt/>
+                  </p:tgtEl>
+                </p:cond>
+              </p:prevCondLst>
+              <p:nextCondLst>
+                <p:cond evt="onNext" delay="0">
+                  <p:tgtEl>
+                    <p:sldTgt/>
+                  </p:tgtEl>
+                </p:cond>
+              </p:nextCondLst>
+            </p:seq>
+          </p:childTnLst>
+        </p:cTn>
       </p:par>
     </p:tnLst>
+    <p:bldLst>
+      <p:bldP spid="3" grpId="0" build="p"/>
+    </p:bldLst>
   </p:timing>
 </p:sld>
 </file>
@@ -20585,13 +22678,13 @@
   <p:clrMapOvr>
     <a:masterClrMapping/>
   </p:clrMapOvr>
-  <mc:AlternateContent xmlns:mc="http://schemas.openxmlformats.org/markup-compatibility/2006" xmlns:p14="http://schemas.microsoft.com/office/powerpoint/2010/main">
-    <mc:Choice Requires="p14">
-      <p:transition>
+  <mc:AlternateContent xmlns:mc="http://schemas.openxmlformats.org/markup-compatibility/2006">
+    <mc:Choice xmlns:p14="http://schemas.microsoft.com/office/powerpoint/2010/main" Requires="p14">
+      <p:transition p14:dur="200">
         <p14:flythrough/>
       </p:transition>
     </mc:Choice>
-    <mc:Fallback xmlns="">
+    <mc:Fallback>
       <p:transition>
         <p:fade/>
       </p:transition>
@@ -20687,8 +22780,13 @@
             </a:r>
             <a:r>
               <a:rPr lang="en-US" dirty="0" smtClean="0"/>
-              <a:t> 2.1 CTP made signification improvements (only 3x slower)</a:t>
-            </a:r>
+              <a:t> 2.1 </a:t>
+            </a:r>
+            <a:r>
+              <a:rPr lang="en-US" dirty="0" smtClean="0"/>
+              <a:t>RTM adds a 2-3x slowdown factor</a:t>
+            </a:r>
+            <a:endParaRPr lang="en-US" dirty="0" smtClean="0"/>
           </a:p>
           <a:p>
             <a:r>
@@ -20716,13 +22814,13 @@
   <p:clrMapOvr>
     <a:masterClrMapping/>
   </p:clrMapOvr>
-  <mc:AlternateContent xmlns:mc="http://schemas.openxmlformats.org/markup-compatibility/2006" xmlns:p14="http://schemas.microsoft.com/office/powerpoint/2010/main">
-    <mc:Choice Requires="p14">
-      <p:transition>
+  <mc:AlternateContent xmlns:mc="http://schemas.openxmlformats.org/markup-compatibility/2006">
+    <mc:Choice xmlns:p14="http://schemas.microsoft.com/office/powerpoint/2010/main" Requires="p14">
+      <p:transition p14:dur="200">
         <p14:flythrough/>
       </p:transition>
     </mc:Choice>
-    <mc:Fallback xmlns="">
+    <mc:Fallback>
       <p:transition>
         <p:fade/>
       </p:transition>
@@ -20731,9 +22829,304 @@
   <p:timing>
     <p:tnLst>
       <p:par>
-        <p:cTn id="1" dur="indefinite" restart="never" nodeType="tmRoot"/>
+        <p:cTn id="1" dur="indefinite" restart="never" nodeType="tmRoot">
+          <p:childTnLst>
+            <p:seq concurrent="1" nextAc="seek">
+              <p:cTn id="2" dur="indefinite" nodeType="mainSeq">
+                <p:childTnLst>
+                  <p:par>
+                    <p:cTn id="3" fill="hold">
+                      <p:stCondLst>
+                        <p:cond delay="indefinite"/>
+                      </p:stCondLst>
+                      <p:childTnLst>
+                        <p:par>
+                          <p:cTn id="4" fill="hold">
+                            <p:stCondLst>
+                              <p:cond delay="0"/>
+                            </p:stCondLst>
+                            <p:childTnLst>
+                              <p:par>
+                                <p:cTn id="5" presetID="10" presetClass="entr" presetSubtype="0" fill="hold" grpId="0" nodeType="clickEffect">
+                                  <p:stCondLst>
+                                    <p:cond delay="0"/>
+                                  </p:stCondLst>
+                                  <p:childTnLst>
+                                    <p:set>
+                                      <p:cBhvr>
+                                        <p:cTn id="6" dur="1" fill="hold">
+                                          <p:stCondLst>
+                                            <p:cond delay="0"/>
+                                          </p:stCondLst>
+                                        </p:cTn>
+                                        <p:tgtEl>
+                                          <p:spTgt spid="3">
+                                            <p:txEl>
+                                              <p:pRg st="0" end="0"/>
+                                            </p:txEl>
+                                          </p:spTgt>
+                                        </p:tgtEl>
+                                        <p:attrNameLst>
+                                          <p:attrName>style.visibility</p:attrName>
+                                        </p:attrNameLst>
+                                      </p:cBhvr>
+                                      <p:to>
+                                        <p:strVal val="visible"/>
+                                      </p:to>
+                                    </p:set>
+                                    <p:animEffect transition="in" filter="fade">
+                                      <p:cBhvr>
+                                        <p:cTn id="7" dur="500"/>
+                                        <p:tgtEl>
+                                          <p:spTgt spid="3">
+                                            <p:txEl>
+                                              <p:pRg st="0" end="0"/>
+                                            </p:txEl>
+                                          </p:spTgt>
+                                        </p:tgtEl>
+                                      </p:cBhvr>
+                                    </p:animEffect>
+                                  </p:childTnLst>
+                                </p:cTn>
+                              </p:par>
+                            </p:childTnLst>
+                          </p:cTn>
+                        </p:par>
+                      </p:childTnLst>
+                    </p:cTn>
+                  </p:par>
+                  <p:par>
+                    <p:cTn id="8" fill="hold">
+                      <p:stCondLst>
+                        <p:cond delay="indefinite"/>
+                      </p:stCondLst>
+                      <p:childTnLst>
+                        <p:par>
+                          <p:cTn id="9" fill="hold">
+                            <p:stCondLst>
+                              <p:cond delay="0"/>
+                            </p:stCondLst>
+                            <p:childTnLst>
+                              <p:par>
+                                <p:cTn id="10" presetID="10" presetClass="entr" presetSubtype="0" fill="hold" grpId="0" nodeType="clickEffect">
+                                  <p:stCondLst>
+                                    <p:cond delay="0"/>
+                                  </p:stCondLst>
+                                  <p:childTnLst>
+                                    <p:set>
+                                      <p:cBhvr>
+                                        <p:cTn id="11" dur="1" fill="hold">
+                                          <p:stCondLst>
+                                            <p:cond delay="0"/>
+                                          </p:stCondLst>
+                                        </p:cTn>
+                                        <p:tgtEl>
+                                          <p:spTgt spid="3">
+                                            <p:txEl>
+                                              <p:pRg st="1" end="1"/>
+                                            </p:txEl>
+                                          </p:spTgt>
+                                        </p:tgtEl>
+                                        <p:attrNameLst>
+                                          <p:attrName>style.visibility</p:attrName>
+                                        </p:attrNameLst>
+                                      </p:cBhvr>
+                                      <p:to>
+                                        <p:strVal val="visible"/>
+                                      </p:to>
+                                    </p:set>
+                                    <p:animEffect transition="in" filter="fade">
+                                      <p:cBhvr>
+                                        <p:cTn id="12" dur="500"/>
+                                        <p:tgtEl>
+                                          <p:spTgt spid="3">
+                                            <p:txEl>
+                                              <p:pRg st="1" end="1"/>
+                                            </p:txEl>
+                                          </p:spTgt>
+                                        </p:tgtEl>
+                                      </p:cBhvr>
+                                    </p:animEffect>
+                                  </p:childTnLst>
+                                </p:cTn>
+                              </p:par>
+                              <p:par>
+                                <p:cTn id="13" presetID="10" presetClass="entr" presetSubtype="0" fill="hold" grpId="0" nodeType="withEffect">
+                                  <p:stCondLst>
+                                    <p:cond delay="0"/>
+                                  </p:stCondLst>
+                                  <p:childTnLst>
+                                    <p:set>
+                                      <p:cBhvr>
+                                        <p:cTn id="14" dur="1" fill="hold">
+                                          <p:stCondLst>
+                                            <p:cond delay="0"/>
+                                          </p:stCondLst>
+                                        </p:cTn>
+                                        <p:tgtEl>
+                                          <p:spTgt spid="3">
+                                            <p:txEl>
+                                              <p:pRg st="2" end="2"/>
+                                            </p:txEl>
+                                          </p:spTgt>
+                                        </p:tgtEl>
+                                        <p:attrNameLst>
+                                          <p:attrName>style.visibility</p:attrName>
+                                        </p:attrNameLst>
+                                      </p:cBhvr>
+                                      <p:to>
+                                        <p:strVal val="visible"/>
+                                      </p:to>
+                                    </p:set>
+                                    <p:animEffect transition="in" filter="fade">
+                                      <p:cBhvr>
+                                        <p:cTn id="15" dur="500"/>
+                                        <p:tgtEl>
+                                          <p:spTgt spid="3">
+                                            <p:txEl>
+                                              <p:pRg st="2" end="2"/>
+                                            </p:txEl>
+                                          </p:spTgt>
+                                        </p:tgtEl>
+                                      </p:cBhvr>
+                                    </p:animEffect>
+                                  </p:childTnLst>
+                                </p:cTn>
+                              </p:par>
+                            </p:childTnLst>
+                          </p:cTn>
+                        </p:par>
+                      </p:childTnLst>
+                    </p:cTn>
+                  </p:par>
+                  <p:par>
+                    <p:cTn id="16" fill="hold">
+                      <p:stCondLst>
+                        <p:cond delay="indefinite"/>
+                      </p:stCondLst>
+                      <p:childTnLst>
+                        <p:par>
+                          <p:cTn id="17" fill="hold">
+                            <p:stCondLst>
+                              <p:cond delay="0"/>
+                            </p:stCondLst>
+                            <p:childTnLst>
+                              <p:par>
+                                <p:cTn id="18" presetID="10" presetClass="entr" presetSubtype="0" fill="hold" grpId="0" nodeType="clickEffect">
+                                  <p:stCondLst>
+                                    <p:cond delay="0"/>
+                                  </p:stCondLst>
+                                  <p:childTnLst>
+                                    <p:set>
+                                      <p:cBhvr>
+                                        <p:cTn id="19" dur="1" fill="hold">
+                                          <p:stCondLst>
+                                            <p:cond delay="0"/>
+                                          </p:stCondLst>
+                                        </p:cTn>
+                                        <p:tgtEl>
+                                          <p:spTgt spid="3">
+                                            <p:txEl>
+                                              <p:pRg st="3" end="3"/>
+                                            </p:txEl>
+                                          </p:spTgt>
+                                        </p:tgtEl>
+                                        <p:attrNameLst>
+                                          <p:attrName>style.visibility</p:attrName>
+                                        </p:attrNameLst>
+                                      </p:cBhvr>
+                                      <p:to>
+                                        <p:strVal val="visible"/>
+                                      </p:to>
+                                    </p:set>
+                                    <p:animEffect transition="in" filter="fade">
+                                      <p:cBhvr>
+                                        <p:cTn id="20" dur="500"/>
+                                        <p:tgtEl>
+                                          <p:spTgt spid="3">
+                                            <p:txEl>
+                                              <p:pRg st="3" end="3"/>
+                                            </p:txEl>
+                                          </p:spTgt>
+                                        </p:tgtEl>
+                                      </p:cBhvr>
+                                    </p:animEffect>
+                                  </p:childTnLst>
+                                </p:cTn>
+                              </p:par>
+                              <p:par>
+                                <p:cTn id="21" presetID="10" presetClass="entr" presetSubtype="0" fill="hold" grpId="0" nodeType="withEffect">
+                                  <p:stCondLst>
+                                    <p:cond delay="0"/>
+                                  </p:stCondLst>
+                                  <p:childTnLst>
+                                    <p:set>
+                                      <p:cBhvr>
+                                        <p:cTn id="22" dur="1" fill="hold">
+                                          <p:stCondLst>
+                                            <p:cond delay="0"/>
+                                          </p:stCondLst>
+                                        </p:cTn>
+                                        <p:tgtEl>
+                                          <p:spTgt spid="3">
+                                            <p:txEl>
+                                              <p:pRg st="4" end="4"/>
+                                            </p:txEl>
+                                          </p:spTgt>
+                                        </p:tgtEl>
+                                        <p:attrNameLst>
+                                          <p:attrName>style.visibility</p:attrName>
+                                        </p:attrNameLst>
+                                      </p:cBhvr>
+                                      <p:to>
+                                        <p:strVal val="visible"/>
+                                      </p:to>
+                                    </p:set>
+                                    <p:animEffect transition="in" filter="fade">
+                                      <p:cBhvr>
+                                        <p:cTn id="23" dur="500"/>
+                                        <p:tgtEl>
+                                          <p:spTgt spid="3">
+                                            <p:txEl>
+                                              <p:pRg st="4" end="4"/>
+                                            </p:txEl>
+                                          </p:spTgt>
+                                        </p:tgtEl>
+                                      </p:cBhvr>
+                                    </p:animEffect>
+                                  </p:childTnLst>
+                                </p:cTn>
+                              </p:par>
+                            </p:childTnLst>
+                          </p:cTn>
+                        </p:par>
+                      </p:childTnLst>
+                    </p:cTn>
+                  </p:par>
+                </p:childTnLst>
+              </p:cTn>
+              <p:prevCondLst>
+                <p:cond evt="onPrev" delay="0">
+                  <p:tgtEl>
+                    <p:sldTgt/>
+                  </p:tgtEl>
+                </p:cond>
+              </p:prevCondLst>
+              <p:nextCondLst>
+                <p:cond evt="onNext" delay="0">
+                  <p:tgtEl>
+                    <p:sldTgt/>
+                  </p:tgtEl>
+                </p:cond>
+              </p:nextCondLst>
+            </p:seq>
+          </p:childTnLst>
+        </p:cTn>
       </p:par>
     </p:tnLst>
+    <p:bldLst>
+      <p:bldP spid="3" grpId="0" build="p"/>
+    </p:bldLst>
   </p:timing>
 </p:sld>
 </file>

</xml_diff>